<commit_message>
Committing changes for Updating slides and lecture notes.
</commit_message>
<xml_diff>
--- a/courseMaterial/Objective-1-Java Language & Environment/1-Programming_Languages.pptx
+++ b/courseMaterial/Objective-1-Java Language & Environment/1-Programming_Languages.pptx
@@ -5,17 +5,19 @@
     <p:sldMasterId id="2147483648" r:id="rId4"/>
   </p:sldMasterIdLst>
   <p:notesMasterIdLst>
-    <p:notesMasterId r:id="rId10"/>
+    <p:notesMasterId r:id="rId12"/>
   </p:notesMasterIdLst>
   <p:handoutMasterIdLst>
-    <p:handoutMasterId r:id="rId11"/>
+    <p:handoutMasterId r:id="rId13"/>
   </p:handoutMasterIdLst>
   <p:sldIdLst>
     <p:sldId id="256" r:id="rId5"/>
     <p:sldId id="267" r:id="rId6"/>
     <p:sldId id="270" r:id="rId7"/>
     <p:sldId id="271" r:id="rId8"/>
-    <p:sldId id="263" r:id="rId9"/>
+    <p:sldId id="273" r:id="rId9"/>
+    <p:sldId id="274" r:id="rId10"/>
+    <p:sldId id="263" r:id="rId11"/>
   </p:sldIdLst>
   <p:sldSz cx="12192000" cy="6858000"/>
   <p:notesSz cx="6858000" cy="9144000"/>
@@ -116,10 +118,21 @@
   </p:defaultTextStyle>
   <p:extLst>
     <p:ext uri="{EFAFB233-063F-42B5-8137-9DF3F51BA10A}">
-      <p15:sldGuideLst xmlns:p15="http://schemas.microsoft.com/office/powerpoint/2012/main" xmlns=""/>
+      <p15:sldGuideLst xmlns:p15="http://schemas.microsoft.com/office/powerpoint/2012/main">
+        <p15:guide id="1" orient="horz" pos="2160">
+          <p15:clr>
+            <a:srgbClr val="A4A3A4"/>
+          </p15:clr>
+        </p15:guide>
+        <p15:guide id="2" pos="3840">
+          <p15:clr>
+            <a:srgbClr val="A4A3A4"/>
+          </p15:clr>
+        </p15:guide>
+      </p15:sldGuideLst>
     </p:ext>
     <p:ext uri="{2D200454-40CA-4A62-9FC3-DE9A4176ACB9}">
-      <p15:notesGuideLst xmlns:p15="http://schemas.microsoft.com/office/powerpoint/2012/main" xmlns=""/>
+      <p15:notesGuideLst xmlns:p15="http://schemas.microsoft.com/office/powerpoint/2012/main"/>
     </p:ext>
   </p:extLst>
 </p:presentation>
@@ -152,7 +165,7 @@
           <p:cNvPr id="2" name="Header Placeholder 1">
             <a:extLst>
               <a:ext uri="{FF2B5EF4-FFF2-40B4-BE49-F238E27FC236}">
-                <a16:creationId xmlns:a16="http://schemas.microsoft.com/office/drawing/2014/main" xmlns="" id="{2BC10188-DC2C-458D-AB41-143A0BE9A310}"/>
+                <a16:creationId xmlns:a16="http://schemas.microsoft.com/office/drawing/2014/main" id="{2BC10188-DC2C-458D-AB41-143A0BE9A310}"/>
               </a:ext>
             </a:extLst>
           </p:cNvPr>
@@ -189,7 +202,7 @@
           <p:cNvPr id="3" name="Date Placeholder 2">
             <a:extLst>
               <a:ext uri="{FF2B5EF4-FFF2-40B4-BE49-F238E27FC236}">
-                <a16:creationId xmlns:a16="http://schemas.microsoft.com/office/drawing/2014/main" xmlns="" id="{C9634E15-7196-43FC-B912-C4D8B4A2CE79}"/>
+                <a16:creationId xmlns:a16="http://schemas.microsoft.com/office/drawing/2014/main" id="{C9634E15-7196-43FC-B912-C4D8B4A2CE79}"/>
               </a:ext>
             </a:extLst>
           </p:cNvPr>
@@ -220,7 +233,7 @@
             <a:fld id="{68416927-5E9C-4E77-85FE-EE4C81C1DE39}" type="datetimeFigureOut">
               <a:rPr lang="en-US" smtClean="0"/>
               <a:pPr/>
-              <a:t>4/19/2020</a:t>
+              <a:t>5/9/2020</a:t>
             </a:fld>
             <a:endParaRPr lang="en-US" dirty="0"/>
           </a:p>
@@ -231,7 +244,7 @@
           <p:cNvPr id="4" name="Footer Placeholder 3">
             <a:extLst>
               <a:ext uri="{FF2B5EF4-FFF2-40B4-BE49-F238E27FC236}">
-                <a16:creationId xmlns:a16="http://schemas.microsoft.com/office/drawing/2014/main" xmlns="" id="{89EA2570-D5B6-41CB-96C2-FFC9944668E5}"/>
+                <a16:creationId xmlns:a16="http://schemas.microsoft.com/office/drawing/2014/main" id="{89EA2570-D5B6-41CB-96C2-FFC9944668E5}"/>
               </a:ext>
             </a:extLst>
           </p:cNvPr>
@@ -268,7 +281,7 @@
           <p:cNvPr id="5" name="Slide Number Placeholder 4">
             <a:extLst>
               <a:ext uri="{FF2B5EF4-FFF2-40B4-BE49-F238E27FC236}">
-                <a16:creationId xmlns:a16="http://schemas.microsoft.com/office/drawing/2014/main" xmlns="" id="{15C31B37-7A69-4C30-9B63-29F8242FC246}"/>
+                <a16:creationId xmlns:a16="http://schemas.microsoft.com/office/drawing/2014/main" id="{15C31B37-7A69-4C30-9B63-29F8242FC246}"/>
               </a:ext>
             </a:extLst>
           </p:cNvPr>
@@ -308,7 +321,7 @@
     </p:spTree>
     <p:extLst>
       <p:ext uri="{BB962C8B-B14F-4D97-AF65-F5344CB8AC3E}">
-        <p14:creationId xmlns:p14="http://schemas.microsoft.com/office/powerpoint/2010/main" xmlns="" val="2413100067"/>
+        <p14:creationId xmlns:p14="http://schemas.microsoft.com/office/powerpoint/2010/main" val="2413100067"/>
       </p:ext>
     </p:extLst>
   </p:cSld>
@@ -399,7 +412,7 @@
             <a:fld id="{FA798B7E-6604-4F74-86DB-B30627D56244}" type="datetimeFigureOut">
               <a:rPr lang="en-US" smtClean="0"/>
               <a:pPr/>
-              <a:t>4/19/2020</a:t>
+              <a:t>5/9/2020</a:t>
             </a:fld>
             <a:endParaRPr lang="en-US" dirty="0"/>
           </a:p>
@@ -567,7 +580,7 @@
     </p:spTree>
     <p:extLst>
       <p:ext uri="{BB962C8B-B14F-4D97-AF65-F5344CB8AC3E}">
-        <p14:creationId xmlns:p14="http://schemas.microsoft.com/office/powerpoint/2010/main" xmlns="" val="2075933273"/>
+        <p14:creationId xmlns:p14="http://schemas.microsoft.com/office/powerpoint/2010/main" val="2075933273"/>
       </p:ext>
     </p:extLst>
   </p:cSld>
@@ -689,7 +702,7 @@
           <p:cNvPr id="2" name="Title 1">
             <a:extLst>
               <a:ext uri="{FF2B5EF4-FFF2-40B4-BE49-F238E27FC236}">
-                <a16:creationId xmlns:a16="http://schemas.microsoft.com/office/drawing/2014/main" xmlns="" id="{E5798B13-3B32-4354-B2B5-3165F2F6E65F}"/>
+                <a16:creationId xmlns:a16="http://schemas.microsoft.com/office/drawing/2014/main" id="{E5798B13-3B32-4354-B2B5-3165F2F6E65F}"/>
               </a:ext>
             </a:extLst>
           </p:cNvPr>
@@ -732,7 +745,7 @@
           <p:cNvPr id="4" name="Text Placeholder 3">
             <a:extLst>
               <a:ext uri="{FF2B5EF4-FFF2-40B4-BE49-F238E27FC236}">
-                <a16:creationId xmlns:a16="http://schemas.microsoft.com/office/drawing/2014/main" xmlns="" id="{16BB88CF-DF4F-4857-8602-72BCF5DDCDA1}"/>
+                <a16:creationId xmlns:a16="http://schemas.microsoft.com/office/drawing/2014/main" id="{16BB88CF-DF4F-4857-8602-72BCF5DDCDA1}"/>
               </a:ext>
             </a:extLst>
           </p:cNvPr>
@@ -803,7 +816,7 @@
           <p:cNvPr id="12" name="Straight Connector 11">
             <a:extLst>
               <a:ext uri="{FF2B5EF4-FFF2-40B4-BE49-F238E27FC236}">
-                <a16:creationId xmlns:a16="http://schemas.microsoft.com/office/drawing/2014/main" xmlns="" id="{A7EEBB7C-1679-4665-8688-1FA973E73DC1}"/>
+                <a16:creationId xmlns:a16="http://schemas.microsoft.com/office/drawing/2014/main" id="{A7EEBB7C-1679-4665-8688-1FA973E73DC1}"/>
               </a:ext>
             </a:extLst>
           </p:cNvPr>
@@ -855,7 +868,7 @@
           <p:cNvPr id="7" name="Rectangle 6">
             <a:extLst>
               <a:ext uri="{FF2B5EF4-FFF2-40B4-BE49-F238E27FC236}">
-                <a16:creationId xmlns:a16="http://schemas.microsoft.com/office/drawing/2014/main" xmlns="" id="{F1E3214F-3A93-4A1C-920D-D86BE35A58FB}"/>
+                <a16:creationId xmlns:a16="http://schemas.microsoft.com/office/drawing/2014/main" id="{F1E3214F-3A93-4A1C-920D-D86BE35A58FB}"/>
               </a:ext>
             </a:extLst>
           </p:cNvPr>
@@ -910,7 +923,7 @@
           <p:cNvPr id="3" name="Slide Number Placeholder 2">
             <a:extLst>
               <a:ext uri="{FF2B5EF4-FFF2-40B4-BE49-F238E27FC236}">
-                <a16:creationId xmlns:a16="http://schemas.microsoft.com/office/drawing/2014/main" xmlns="" id="{213E97E5-C83B-444A-8C07-35D699E7C342}"/>
+                <a16:creationId xmlns:a16="http://schemas.microsoft.com/office/drawing/2014/main" id="{213E97E5-C83B-444A-8C07-35D699E7C342}"/>
               </a:ext>
             </a:extLst>
           </p:cNvPr>
@@ -942,7 +955,7 @@
     </p:spTree>
     <p:extLst>
       <p:ext uri="{BB962C8B-B14F-4D97-AF65-F5344CB8AC3E}">
-        <p14:creationId xmlns:p14="http://schemas.microsoft.com/office/powerpoint/2010/main" xmlns="" val="2226532245"/>
+        <p14:creationId xmlns:p14="http://schemas.microsoft.com/office/powerpoint/2010/main" val="2226532245"/>
       </p:ext>
     </p:extLst>
   </p:cSld>
@@ -974,7 +987,7 @@
           <p:cNvPr id="2" name="Title 1">
             <a:extLst>
               <a:ext uri="{FF2B5EF4-FFF2-40B4-BE49-F238E27FC236}">
-                <a16:creationId xmlns:a16="http://schemas.microsoft.com/office/drawing/2014/main" xmlns="" id="{0D1AB651-5612-4E6A-9B35-A555D082EC2F}"/>
+                <a16:creationId xmlns:a16="http://schemas.microsoft.com/office/drawing/2014/main" id="{0D1AB651-5612-4E6A-9B35-A555D082EC2F}"/>
               </a:ext>
             </a:extLst>
           </p:cNvPr>
@@ -1003,7 +1016,7 @@
           <p:cNvPr id="3" name="Content Placeholder 2">
             <a:extLst>
               <a:ext uri="{FF2B5EF4-FFF2-40B4-BE49-F238E27FC236}">
-                <a16:creationId xmlns:a16="http://schemas.microsoft.com/office/drawing/2014/main" xmlns="" id="{881389A2-D77B-40CA-AD1E-0178AEFAD15A}"/>
+                <a16:creationId xmlns:a16="http://schemas.microsoft.com/office/drawing/2014/main" id="{881389A2-D77B-40CA-AD1E-0178AEFAD15A}"/>
               </a:ext>
             </a:extLst>
           </p:cNvPr>
@@ -1084,7 +1097,7 @@
           <p:cNvPr id="4" name="Content Placeholder 3">
             <a:extLst>
               <a:ext uri="{FF2B5EF4-FFF2-40B4-BE49-F238E27FC236}">
-                <a16:creationId xmlns:a16="http://schemas.microsoft.com/office/drawing/2014/main" xmlns="" id="{A1DCA993-CBEA-48C5-BD35-50ABDFF64065}"/>
+                <a16:creationId xmlns:a16="http://schemas.microsoft.com/office/drawing/2014/main" id="{A1DCA993-CBEA-48C5-BD35-50ABDFF64065}"/>
               </a:ext>
             </a:extLst>
           </p:cNvPr>
@@ -1165,7 +1178,7 @@
           <p:cNvPr id="5" name="Slide Number Placeholder 4">
             <a:extLst>
               <a:ext uri="{FF2B5EF4-FFF2-40B4-BE49-F238E27FC236}">
-                <a16:creationId xmlns:a16="http://schemas.microsoft.com/office/drawing/2014/main" xmlns="" id="{B88ED8E0-95EC-469F-9B7E-562FBDFDE6CC}"/>
+                <a16:creationId xmlns:a16="http://schemas.microsoft.com/office/drawing/2014/main" id="{B88ED8E0-95EC-469F-9B7E-562FBDFDE6CC}"/>
               </a:ext>
             </a:extLst>
           </p:cNvPr>
@@ -1197,7 +1210,7 @@
     </p:spTree>
     <p:extLst>
       <p:ext uri="{BB962C8B-B14F-4D97-AF65-F5344CB8AC3E}">
-        <p14:creationId xmlns:p14="http://schemas.microsoft.com/office/powerpoint/2010/main" xmlns="" val="646344805"/>
+        <p14:creationId xmlns:p14="http://schemas.microsoft.com/office/powerpoint/2010/main" val="646344805"/>
       </p:ext>
     </p:extLst>
   </p:cSld>
@@ -1229,7 +1242,7 @@
           <p:cNvPr id="2" name="Title 1">
             <a:extLst>
               <a:ext uri="{FF2B5EF4-FFF2-40B4-BE49-F238E27FC236}">
-                <a16:creationId xmlns:a16="http://schemas.microsoft.com/office/drawing/2014/main" xmlns="" id="{EF776F88-2A37-410D-A685-E455AF3D07B4}"/>
+                <a16:creationId xmlns:a16="http://schemas.microsoft.com/office/drawing/2014/main" id="{EF776F88-2A37-410D-A685-E455AF3D07B4}"/>
               </a:ext>
             </a:extLst>
           </p:cNvPr>
@@ -1263,7 +1276,7 @@
           <p:cNvPr id="3" name="Text Placeholder 2">
             <a:extLst>
               <a:ext uri="{FF2B5EF4-FFF2-40B4-BE49-F238E27FC236}">
-                <a16:creationId xmlns:a16="http://schemas.microsoft.com/office/drawing/2014/main" xmlns="" id="{6C764B46-B015-44F7-8DC0-AFB8D275E486}"/>
+                <a16:creationId xmlns:a16="http://schemas.microsoft.com/office/drawing/2014/main" id="{6C764B46-B015-44F7-8DC0-AFB8D275E486}"/>
               </a:ext>
             </a:extLst>
           </p:cNvPr>
@@ -1334,7 +1347,7 @@
           <p:cNvPr id="4" name="Content Placeholder 3">
             <a:extLst>
               <a:ext uri="{FF2B5EF4-FFF2-40B4-BE49-F238E27FC236}">
-                <a16:creationId xmlns:a16="http://schemas.microsoft.com/office/drawing/2014/main" xmlns="" id="{2D3C8232-2077-497A-9142-B787E2B03A73}"/>
+                <a16:creationId xmlns:a16="http://schemas.microsoft.com/office/drawing/2014/main" id="{2D3C8232-2077-497A-9142-B787E2B03A73}"/>
               </a:ext>
             </a:extLst>
           </p:cNvPr>
@@ -1415,7 +1428,7 @@
           <p:cNvPr id="5" name="Text Placeholder 4">
             <a:extLst>
               <a:ext uri="{FF2B5EF4-FFF2-40B4-BE49-F238E27FC236}">
-                <a16:creationId xmlns:a16="http://schemas.microsoft.com/office/drawing/2014/main" xmlns="" id="{AAF6077C-D913-4FD0-B6E0-6D70BEFD40E6}"/>
+                <a16:creationId xmlns:a16="http://schemas.microsoft.com/office/drawing/2014/main" id="{AAF6077C-D913-4FD0-B6E0-6D70BEFD40E6}"/>
               </a:ext>
             </a:extLst>
           </p:cNvPr>
@@ -1486,7 +1499,7 @@
           <p:cNvPr id="6" name="Content Placeholder 5">
             <a:extLst>
               <a:ext uri="{FF2B5EF4-FFF2-40B4-BE49-F238E27FC236}">
-                <a16:creationId xmlns:a16="http://schemas.microsoft.com/office/drawing/2014/main" xmlns="" id="{43905DBB-3AA9-4435-AC97-732293FDE7EF}"/>
+                <a16:creationId xmlns:a16="http://schemas.microsoft.com/office/drawing/2014/main" id="{43905DBB-3AA9-4435-AC97-732293FDE7EF}"/>
               </a:ext>
             </a:extLst>
           </p:cNvPr>
@@ -1567,7 +1580,7 @@
           <p:cNvPr id="7" name="Slide Number Placeholder 6">
             <a:extLst>
               <a:ext uri="{FF2B5EF4-FFF2-40B4-BE49-F238E27FC236}">
-                <a16:creationId xmlns:a16="http://schemas.microsoft.com/office/drawing/2014/main" xmlns="" id="{1954C901-FCAF-4DFB-A621-6A969641CA73}"/>
+                <a16:creationId xmlns:a16="http://schemas.microsoft.com/office/drawing/2014/main" id="{1954C901-FCAF-4DFB-A621-6A969641CA73}"/>
               </a:ext>
             </a:extLst>
           </p:cNvPr>
@@ -1599,7 +1612,7 @@
     </p:spTree>
     <p:extLst>
       <p:ext uri="{BB962C8B-B14F-4D97-AF65-F5344CB8AC3E}">
-        <p14:creationId xmlns:p14="http://schemas.microsoft.com/office/powerpoint/2010/main" xmlns="" val="2292145525"/>
+        <p14:creationId xmlns:p14="http://schemas.microsoft.com/office/powerpoint/2010/main" val="2292145525"/>
       </p:ext>
     </p:extLst>
   </p:cSld>
@@ -1631,7 +1644,7 @@
           <p:cNvPr id="2" name="Title 1">
             <a:extLst>
               <a:ext uri="{FF2B5EF4-FFF2-40B4-BE49-F238E27FC236}">
-                <a16:creationId xmlns:a16="http://schemas.microsoft.com/office/drawing/2014/main" xmlns="" id="{99AF2623-2255-4BBA-9577-B3A3FD2AE8E8}"/>
+                <a16:creationId xmlns:a16="http://schemas.microsoft.com/office/drawing/2014/main" id="{99AF2623-2255-4BBA-9577-B3A3FD2AE8E8}"/>
               </a:ext>
             </a:extLst>
           </p:cNvPr>
@@ -1660,7 +1673,7 @@
           <p:cNvPr id="3" name="Slide Number Placeholder 2">
             <a:extLst>
               <a:ext uri="{FF2B5EF4-FFF2-40B4-BE49-F238E27FC236}">
-                <a16:creationId xmlns:a16="http://schemas.microsoft.com/office/drawing/2014/main" xmlns="" id="{5259F0F0-5E7C-4FC9-8E90-6ADCD7A714B6}"/>
+                <a16:creationId xmlns:a16="http://schemas.microsoft.com/office/drawing/2014/main" id="{5259F0F0-5E7C-4FC9-8E90-6ADCD7A714B6}"/>
               </a:ext>
             </a:extLst>
           </p:cNvPr>
@@ -1692,7 +1705,7 @@
     </p:spTree>
     <p:extLst>
       <p:ext uri="{BB962C8B-B14F-4D97-AF65-F5344CB8AC3E}">
-        <p14:creationId xmlns:p14="http://schemas.microsoft.com/office/powerpoint/2010/main" xmlns="" val="3105532259"/>
+        <p14:creationId xmlns:p14="http://schemas.microsoft.com/office/powerpoint/2010/main" val="3105532259"/>
       </p:ext>
     </p:extLst>
   </p:cSld>
@@ -1724,7 +1737,7 @@
           <p:cNvPr id="2" name="Slide Number Placeholder 1">
             <a:extLst>
               <a:ext uri="{FF2B5EF4-FFF2-40B4-BE49-F238E27FC236}">
-                <a16:creationId xmlns:a16="http://schemas.microsoft.com/office/drawing/2014/main" xmlns="" id="{0A9D3FFB-BE14-4D90-A515-10EDD1BEE6F1}"/>
+                <a16:creationId xmlns:a16="http://schemas.microsoft.com/office/drawing/2014/main" id="{0A9D3FFB-BE14-4D90-A515-10EDD1BEE6F1}"/>
               </a:ext>
             </a:extLst>
           </p:cNvPr>
@@ -1756,7 +1769,7 @@
     </p:spTree>
     <p:extLst>
       <p:ext uri="{BB962C8B-B14F-4D97-AF65-F5344CB8AC3E}">
-        <p14:creationId xmlns:p14="http://schemas.microsoft.com/office/powerpoint/2010/main" xmlns="" val="3627673970"/>
+        <p14:creationId xmlns:p14="http://schemas.microsoft.com/office/powerpoint/2010/main" val="3627673970"/>
       </p:ext>
     </p:extLst>
   </p:cSld>
@@ -1788,7 +1801,7 @@
           <p:cNvPr id="2" name="Title 1">
             <a:extLst>
               <a:ext uri="{FF2B5EF4-FFF2-40B4-BE49-F238E27FC236}">
-                <a16:creationId xmlns:a16="http://schemas.microsoft.com/office/drawing/2014/main" xmlns="" id="{A2451E51-BE82-4B1B-9CB6-89C26464DBE2}"/>
+                <a16:creationId xmlns:a16="http://schemas.microsoft.com/office/drawing/2014/main" id="{A2451E51-BE82-4B1B-9CB6-89C26464DBE2}"/>
               </a:ext>
             </a:extLst>
           </p:cNvPr>
@@ -1826,7 +1839,7 @@
           <p:cNvPr id="3" name="Content Placeholder 2">
             <a:extLst>
               <a:ext uri="{FF2B5EF4-FFF2-40B4-BE49-F238E27FC236}">
-                <a16:creationId xmlns:a16="http://schemas.microsoft.com/office/drawing/2014/main" xmlns="" id="{04CCBF8C-3CF7-47E6-9AB0-15584178B449}"/>
+                <a16:creationId xmlns:a16="http://schemas.microsoft.com/office/drawing/2014/main" id="{04CCBF8C-3CF7-47E6-9AB0-15584178B449}"/>
               </a:ext>
             </a:extLst>
           </p:cNvPr>
@@ -1917,7 +1930,7 @@
           <p:cNvPr id="4" name="Text Placeholder 3">
             <a:extLst>
               <a:ext uri="{FF2B5EF4-FFF2-40B4-BE49-F238E27FC236}">
-                <a16:creationId xmlns:a16="http://schemas.microsoft.com/office/drawing/2014/main" xmlns="" id="{3D07DA3C-0298-45CF-AFC3-41031C0763E3}"/>
+                <a16:creationId xmlns:a16="http://schemas.microsoft.com/office/drawing/2014/main" id="{3D07DA3C-0298-45CF-AFC3-41031C0763E3}"/>
               </a:ext>
             </a:extLst>
           </p:cNvPr>
@@ -1988,7 +2001,7 @@
           <p:cNvPr id="5" name="Slide Number Placeholder 4">
             <a:extLst>
               <a:ext uri="{FF2B5EF4-FFF2-40B4-BE49-F238E27FC236}">
-                <a16:creationId xmlns:a16="http://schemas.microsoft.com/office/drawing/2014/main" xmlns="" id="{F7C4FF87-D01E-416B-9EF8-E107C4EDDC42}"/>
+                <a16:creationId xmlns:a16="http://schemas.microsoft.com/office/drawing/2014/main" id="{F7C4FF87-D01E-416B-9EF8-E107C4EDDC42}"/>
               </a:ext>
             </a:extLst>
           </p:cNvPr>
@@ -2020,7 +2033,7 @@
     </p:spTree>
     <p:extLst>
       <p:ext uri="{BB962C8B-B14F-4D97-AF65-F5344CB8AC3E}">
-        <p14:creationId xmlns:p14="http://schemas.microsoft.com/office/powerpoint/2010/main" xmlns="" val="398533459"/>
+        <p14:creationId xmlns:p14="http://schemas.microsoft.com/office/powerpoint/2010/main" val="398533459"/>
       </p:ext>
     </p:extLst>
   </p:cSld>
@@ -2052,7 +2065,7 @@
           <p:cNvPr id="2" name="Title 1">
             <a:extLst>
               <a:ext uri="{FF2B5EF4-FFF2-40B4-BE49-F238E27FC236}">
-                <a16:creationId xmlns:a16="http://schemas.microsoft.com/office/drawing/2014/main" xmlns="" id="{E5798B13-3B32-4354-B2B5-3165F2F6E65F}"/>
+                <a16:creationId xmlns:a16="http://schemas.microsoft.com/office/drawing/2014/main" id="{E5798B13-3B32-4354-B2B5-3165F2F6E65F}"/>
               </a:ext>
             </a:extLst>
           </p:cNvPr>
@@ -2095,7 +2108,7 @@
           <p:cNvPr id="4" name="Text Placeholder 3">
             <a:extLst>
               <a:ext uri="{FF2B5EF4-FFF2-40B4-BE49-F238E27FC236}">
-                <a16:creationId xmlns:a16="http://schemas.microsoft.com/office/drawing/2014/main" xmlns="" id="{16BB88CF-DF4F-4857-8602-72BCF5DDCDA1}"/>
+                <a16:creationId xmlns:a16="http://schemas.microsoft.com/office/drawing/2014/main" id="{16BB88CF-DF4F-4857-8602-72BCF5DDCDA1}"/>
               </a:ext>
             </a:extLst>
           </p:cNvPr>
@@ -2166,7 +2179,7 @@
           <p:cNvPr id="12" name="Straight Connector 11">
             <a:extLst>
               <a:ext uri="{FF2B5EF4-FFF2-40B4-BE49-F238E27FC236}">
-                <a16:creationId xmlns:a16="http://schemas.microsoft.com/office/drawing/2014/main" xmlns="" id="{A7EEBB7C-1679-4665-8688-1FA973E73DC1}"/>
+                <a16:creationId xmlns:a16="http://schemas.microsoft.com/office/drawing/2014/main" id="{A7EEBB7C-1679-4665-8688-1FA973E73DC1}"/>
               </a:ext>
             </a:extLst>
           </p:cNvPr>
@@ -2218,7 +2231,7 @@
           <p:cNvPr id="7" name="Rectangle 6">
             <a:extLst>
               <a:ext uri="{FF2B5EF4-FFF2-40B4-BE49-F238E27FC236}">
-                <a16:creationId xmlns:a16="http://schemas.microsoft.com/office/drawing/2014/main" xmlns="" id="{F1E3214F-3A93-4A1C-920D-D86BE35A58FB}"/>
+                <a16:creationId xmlns:a16="http://schemas.microsoft.com/office/drawing/2014/main" id="{F1E3214F-3A93-4A1C-920D-D86BE35A58FB}"/>
               </a:ext>
             </a:extLst>
           </p:cNvPr>
@@ -2273,7 +2286,7 @@
           <p:cNvPr id="3" name="Slide Number Placeholder 2">
             <a:extLst>
               <a:ext uri="{FF2B5EF4-FFF2-40B4-BE49-F238E27FC236}">
-                <a16:creationId xmlns:a16="http://schemas.microsoft.com/office/drawing/2014/main" xmlns="" id="{213E97E5-C83B-444A-8C07-35D699E7C342}"/>
+                <a16:creationId xmlns:a16="http://schemas.microsoft.com/office/drawing/2014/main" id="{213E97E5-C83B-444A-8C07-35D699E7C342}"/>
               </a:ext>
             </a:extLst>
           </p:cNvPr>
@@ -2307,7 +2320,7 @@
           <p:cNvPr id="8" name="Picture Placeholder 2">
             <a:extLst>
               <a:ext uri="{FF2B5EF4-FFF2-40B4-BE49-F238E27FC236}">
-                <a16:creationId xmlns:a16="http://schemas.microsoft.com/office/drawing/2014/main" xmlns="" id="{2641ECAC-0557-4843-8433-067E4414E2F5}"/>
+                <a16:creationId xmlns:a16="http://schemas.microsoft.com/office/drawing/2014/main" id="{2641ECAC-0557-4843-8433-067E4414E2F5}"/>
               </a:ext>
             </a:extLst>
           </p:cNvPr>
@@ -2383,7 +2396,7 @@
     </p:spTree>
     <p:extLst>
       <p:ext uri="{BB962C8B-B14F-4D97-AF65-F5344CB8AC3E}">
-        <p14:creationId xmlns:p14="http://schemas.microsoft.com/office/powerpoint/2010/main" xmlns="" val="3394383312"/>
+        <p14:creationId xmlns:p14="http://schemas.microsoft.com/office/powerpoint/2010/main" val="3394383312"/>
       </p:ext>
     </p:extLst>
   </p:cSld>
@@ -2426,7 +2439,7 @@
           <p:cNvPr id="2" name="Title 1">
             <a:extLst>
               <a:ext uri="{FF2B5EF4-FFF2-40B4-BE49-F238E27FC236}">
-                <a16:creationId xmlns:a16="http://schemas.microsoft.com/office/drawing/2014/main" xmlns="" id="{FE91AD08-4E28-4191-9B62-EAD61608E5CF}"/>
+                <a16:creationId xmlns:a16="http://schemas.microsoft.com/office/drawing/2014/main" id="{FE91AD08-4E28-4191-9B62-EAD61608E5CF}"/>
               </a:ext>
             </a:extLst>
           </p:cNvPr>
@@ -2474,7 +2487,7 @@
           <p:cNvPr id="3" name="Content Placeholder 2">
             <a:extLst>
               <a:ext uri="{FF2B5EF4-FFF2-40B4-BE49-F238E27FC236}">
-                <a16:creationId xmlns:a16="http://schemas.microsoft.com/office/drawing/2014/main" xmlns="" id="{90BF853D-76DB-46F3-AF6C-1E77C8E06AA9}"/>
+                <a16:creationId xmlns:a16="http://schemas.microsoft.com/office/drawing/2014/main" id="{90BF853D-76DB-46F3-AF6C-1E77C8E06AA9}"/>
               </a:ext>
             </a:extLst>
           </p:cNvPr>
@@ -2555,7 +2568,7 @@
           <p:cNvPr id="4" name="Slide Number Placeholder 3">
             <a:extLst>
               <a:ext uri="{FF2B5EF4-FFF2-40B4-BE49-F238E27FC236}">
-                <a16:creationId xmlns:a16="http://schemas.microsoft.com/office/drawing/2014/main" xmlns="" id="{0660D61A-B9FD-4DFF-AC42-4069DAFE238C}"/>
+                <a16:creationId xmlns:a16="http://schemas.microsoft.com/office/drawing/2014/main" id="{0660D61A-B9FD-4DFF-AC42-4069DAFE238C}"/>
               </a:ext>
             </a:extLst>
           </p:cNvPr>
@@ -2587,7 +2600,7 @@
     </p:spTree>
     <p:extLst>
       <p:ext uri="{BB962C8B-B14F-4D97-AF65-F5344CB8AC3E}">
-        <p14:creationId xmlns:p14="http://schemas.microsoft.com/office/powerpoint/2010/main" xmlns="" val="3839236654"/>
+        <p14:creationId xmlns:p14="http://schemas.microsoft.com/office/powerpoint/2010/main" val="3839236654"/>
       </p:ext>
     </p:extLst>
   </p:cSld>
@@ -2630,7 +2643,7 @@
           <p:cNvPr id="2" name="Title 1">
             <a:extLst>
               <a:ext uri="{FF2B5EF4-FFF2-40B4-BE49-F238E27FC236}">
-                <a16:creationId xmlns:a16="http://schemas.microsoft.com/office/drawing/2014/main" xmlns="" id="{FE91AD08-4E28-4191-9B62-EAD61608E5CF}"/>
+                <a16:creationId xmlns:a16="http://schemas.microsoft.com/office/drawing/2014/main" id="{FE91AD08-4E28-4191-9B62-EAD61608E5CF}"/>
               </a:ext>
             </a:extLst>
           </p:cNvPr>
@@ -2680,7 +2693,7 @@
           <p:cNvPr id="3" name="Content Placeholder 2">
             <a:extLst>
               <a:ext uri="{FF2B5EF4-FFF2-40B4-BE49-F238E27FC236}">
-                <a16:creationId xmlns:a16="http://schemas.microsoft.com/office/drawing/2014/main" xmlns="" id="{90BF853D-76DB-46F3-AF6C-1E77C8E06AA9}"/>
+                <a16:creationId xmlns:a16="http://schemas.microsoft.com/office/drawing/2014/main" id="{90BF853D-76DB-46F3-AF6C-1E77C8E06AA9}"/>
               </a:ext>
             </a:extLst>
           </p:cNvPr>
@@ -2761,7 +2774,7 @@
           <p:cNvPr id="4" name="Slide Number Placeholder 3">
             <a:extLst>
               <a:ext uri="{FF2B5EF4-FFF2-40B4-BE49-F238E27FC236}">
-                <a16:creationId xmlns:a16="http://schemas.microsoft.com/office/drawing/2014/main" xmlns="" id="{0660D61A-B9FD-4DFF-AC42-4069DAFE238C}"/>
+                <a16:creationId xmlns:a16="http://schemas.microsoft.com/office/drawing/2014/main" id="{0660D61A-B9FD-4DFF-AC42-4069DAFE238C}"/>
               </a:ext>
             </a:extLst>
           </p:cNvPr>
@@ -2793,7 +2806,7 @@
     </p:spTree>
     <p:extLst>
       <p:ext uri="{BB962C8B-B14F-4D97-AF65-F5344CB8AC3E}">
-        <p14:creationId xmlns:p14="http://schemas.microsoft.com/office/powerpoint/2010/main" xmlns="" val="1594571051"/>
+        <p14:creationId xmlns:p14="http://schemas.microsoft.com/office/powerpoint/2010/main" val="1594571051"/>
       </p:ext>
     </p:extLst>
   </p:cSld>
@@ -2825,7 +2838,7 @@
           <p:cNvPr id="7" name="Picture Placeholder 2">
             <a:extLst>
               <a:ext uri="{FF2B5EF4-FFF2-40B4-BE49-F238E27FC236}">
-                <a16:creationId xmlns:a16="http://schemas.microsoft.com/office/drawing/2014/main" xmlns="" id="{6D3C5ED2-B01D-4104-B193-BC78D76A4646}"/>
+                <a16:creationId xmlns:a16="http://schemas.microsoft.com/office/drawing/2014/main" id="{6D3C5ED2-B01D-4104-B193-BC78D76A4646}"/>
               </a:ext>
             </a:extLst>
           </p:cNvPr>
@@ -2898,7 +2911,7 @@
           <p:cNvPr id="2" name="Title 1">
             <a:extLst>
               <a:ext uri="{FF2B5EF4-FFF2-40B4-BE49-F238E27FC236}">
-                <a16:creationId xmlns:a16="http://schemas.microsoft.com/office/drawing/2014/main" xmlns="" id="{FE91AD08-4E28-4191-9B62-EAD61608E5CF}"/>
+                <a16:creationId xmlns:a16="http://schemas.microsoft.com/office/drawing/2014/main" id="{FE91AD08-4E28-4191-9B62-EAD61608E5CF}"/>
               </a:ext>
             </a:extLst>
           </p:cNvPr>
@@ -2945,7 +2958,7 @@
           <p:cNvPr id="3" name="Content Placeholder 2">
             <a:extLst>
               <a:ext uri="{FF2B5EF4-FFF2-40B4-BE49-F238E27FC236}">
-                <a16:creationId xmlns:a16="http://schemas.microsoft.com/office/drawing/2014/main" xmlns="" id="{90BF853D-76DB-46F3-AF6C-1E77C8E06AA9}"/>
+                <a16:creationId xmlns:a16="http://schemas.microsoft.com/office/drawing/2014/main" id="{90BF853D-76DB-46F3-AF6C-1E77C8E06AA9}"/>
               </a:ext>
             </a:extLst>
           </p:cNvPr>
@@ -3026,7 +3039,7 @@
           <p:cNvPr id="4" name="Slide Number Placeholder 3">
             <a:extLst>
               <a:ext uri="{FF2B5EF4-FFF2-40B4-BE49-F238E27FC236}">
-                <a16:creationId xmlns:a16="http://schemas.microsoft.com/office/drawing/2014/main" xmlns="" id="{0660D61A-B9FD-4DFF-AC42-4069DAFE238C}"/>
+                <a16:creationId xmlns:a16="http://schemas.microsoft.com/office/drawing/2014/main" id="{0660D61A-B9FD-4DFF-AC42-4069DAFE238C}"/>
               </a:ext>
             </a:extLst>
           </p:cNvPr>
@@ -3063,7 +3076,7 @@
     </p:spTree>
     <p:extLst>
       <p:ext uri="{BB962C8B-B14F-4D97-AF65-F5344CB8AC3E}">
-        <p14:creationId xmlns:p14="http://schemas.microsoft.com/office/powerpoint/2010/main" xmlns="" val="1797904098"/>
+        <p14:creationId xmlns:p14="http://schemas.microsoft.com/office/powerpoint/2010/main" val="1797904098"/>
       </p:ext>
     </p:extLst>
   </p:cSld>
@@ -3095,7 +3108,7 @@
           <p:cNvPr id="2" name="Title 1">
             <a:extLst>
               <a:ext uri="{FF2B5EF4-FFF2-40B4-BE49-F238E27FC236}">
-                <a16:creationId xmlns:a16="http://schemas.microsoft.com/office/drawing/2014/main" xmlns="" id="{FE91AD08-4E28-4191-9B62-EAD61608E5CF}"/>
+                <a16:creationId xmlns:a16="http://schemas.microsoft.com/office/drawing/2014/main" id="{FE91AD08-4E28-4191-9B62-EAD61608E5CF}"/>
               </a:ext>
             </a:extLst>
           </p:cNvPr>
@@ -3155,7 +3168,7 @@
           <p:cNvPr id="3" name="Content Placeholder 2">
             <a:extLst>
               <a:ext uri="{FF2B5EF4-FFF2-40B4-BE49-F238E27FC236}">
-                <a16:creationId xmlns:a16="http://schemas.microsoft.com/office/drawing/2014/main" xmlns="" id="{90BF853D-76DB-46F3-AF6C-1E77C8E06AA9}"/>
+                <a16:creationId xmlns:a16="http://schemas.microsoft.com/office/drawing/2014/main" id="{90BF853D-76DB-46F3-AF6C-1E77C8E06AA9}"/>
               </a:ext>
             </a:extLst>
           </p:cNvPr>
@@ -3236,7 +3249,7 @@
           <p:cNvPr id="14" name="Slide Number Placeholder 13">
             <a:extLst>
               <a:ext uri="{FF2B5EF4-FFF2-40B4-BE49-F238E27FC236}">
-                <a16:creationId xmlns:a16="http://schemas.microsoft.com/office/drawing/2014/main" xmlns="" id="{7746CAFB-2B99-470B-B55B-9BF378E3A04B}"/>
+                <a16:creationId xmlns:a16="http://schemas.microsoft.com/office/drawing/2014/main" id="{7746CAFB-2B99-470B-B55B-9BF378E3A04B}"/>
               </a:ext>
             </a:extLst>
           </p:cNvPr>
@@ -3268,7 +3281,7 @@
     </p:spTree>
     <p:extLst>
       <p:ext uri="{BB962C8B-B14F-4D97-AF65-F5344CB8AC3E}">
-        <p14:creationId xmlns:p14="http://schemas.microsoft.com/office/powerpoint/2010/main" xmlns="" val="1160496352"/>
+        <p14:creationId xmlns:p14="http://schemas.microsoft.com/office/powerpoint/2010/main" val="1160496352"/>
       </p:ext>
     </p:extLst>
   </p:cSld>
@@ -3300,7 +3313,7 @@
           <p:cNvPr id="17" name="Title 16">
             <a:extLst>
               <a:ext uri="{FF2B5EF4-FFF2-40B4-BE49-F238E27FC236}">
-                <a16:creationId xmlns:a16="http://schemas.microsoft.com/office/drawing/2014/main" xmlns="" id="{65237DA4-112F-40B2-8C8C-EB23506D9C45}"/>
+                <a16:creationId xmlns:a16="http://schemas.microsoft.com/office/drawing/2014/main" id="{65237DA4-112F-40B2-8C8C-EB23506D9C45}"/>
               </a:ext>
             </a:extLst>
           </p:cNvPr>
@@ -3359,7 +3372,7 @@
           <p:cNvPr id="3" name="Content Placeholder 2">
             <a:extLst>
               <a:ext uri="{FF2B5EF4-FFF2-40B4-BE49-F238E27FC236}">
-                <a16:creationId xmlns:a16="http://schemas.microsoft.com/office/drawing/2014/main" xmlns="" id="{90BF853D-76DB-46F3-AF6C-1E77C8E06AA9}"/>
+                <a16:creationId xmlns:a16="http://schemas.microsoft.com/office/drawing/2014/main" id="{90BF853D-76DB-46F3-AF6C-1E77C8E06AA9}"/>
               </a:ext>
             </a:extLst>
           </p:cNvPr>
@@ -3422,7 +3435,7 @@
           <p:cNvPr id="14" name="Slide Number Placeholder 13">
             <a:extLst>
               <a:ext uri="{FF2B5EF4-FFF2-40B4-BE49-F238E27FC236}">
-                <a16:creationId xmlns:a16="http://schemas.microsoft.com/office/drawing/2014/main" xmlns="" id="{7746CAFB-2B99-470B-B55B-9BF378E3A04B}"/>
+                <a16:creationId xmlns:a16="http://schemas.microsoft.com/office/drawing/2014/main" id="{7746CAFB-2B99-470B-B55B-9BF378E3A04B}"/>
               </a:ext>
             </a:extLst>
           </p:cNvPr>
@@ -3471,7 +3484,7 @@
     </p:spTree>
     <p:extLst>
       <p:ext uri="{BB962C8B-B14F-4D97-AF65-F5344CB8AC3E}">
-        <p14:creationId xmlns:p14="http://schemas.microsoft.com/office/powerpoint/2010/main" xmlns="" val="364498605"/>
+        <p14:creationId xmlns:p14="http://schemas.microsoft.com/office/powerpoint/2010/main" val="364498605"/>
       </p:ext>
     </p:extLst>
   </p:cSld>
@@ -3503,7 +3516,7 @@
           <p:cNvPr id="4" name="Slide Number Placeholder 3">
             <a:extLst>
               <a:ext uri="{FF2B5EF4-FFF2-40B4-BE49-F238E27FC236}">
-                <a16:creationId xmlns:a16="http://schemas.microsoft.com/office/drawing/2014/main" xmlns="" id="{0660D61A-B9FD-4DFF-AC42-4069DAFE238C}"/>
+                <a16:creationId xmlns:a16="http://schemas.microsoft.com/office/drawing/2014/main" id="{0660D61A-B9FD-4DFF-AC42-4069DAFE238C}"/>
               </a:ext>
             </a:extLst>
           </p:cNvPr>
@@ -3537,7 +3550,7 @@
           <p:cNvPr id="5" name="Content Placeholder 2">
             <a:extLst>
               <a:ext uri="{FF2B5EF4-FFF2-40B4-BE49-F238E27FC236}">
-                <a16:creationId xmlns:a16="http://schemas.microsoft.com/office/drawing/2014/main" xmlns="" id="{D68E6EF2-4B2F-4D0D-9505-CE92872972F7}"/>
+                <a16:creationId xmlns:a16="http://schemas.microsoft.com/office/drawing/2014/main" id="{D68E6EF2-4B2F-4D0D-9505-CE92872972F7}"/>
               </a:ext>
             </a:extLst>
           </p:cNvPr>
@@ -3600,7 +3613,7 @@
           <p:cNvPr id="6" name="Title 1">
             <a:extLst>
               <a:ext uri="{FF2B5EF4-FFF2-40B4-BE49-F238E27FC236}">
-                <a16:creationId xmlns:a16="http://schemas.microsoft.com/office/drawing/2014/main" xmlns="" id="{D91A21B9-BA54-413B-940E-027C32E4D429}"/>
+                <a16:creationId xmlns:a16="http://schemas.microsoft.com/office/drawing/2014/main" id="{D91A21B9-BA54-413B-940E-027C32E4D429}"/>
               </a:ext>
             </a:extLst>
           </p:cNvPr>
@@ -3646,7 +3659,7 @@
     </p:spTree>
     <p:extLst>
       <p:ext uri="{BB962C8B-B14F-4D97-AF65-F5344CB8AC3E}">
-        <p14:creationId xmlns:p14="http://schemas.microsoft.com/office/powerpoint/2010/main" xmlns="" val="3610051244"/>
+        <p14:creationId xmlns:p14="http://schemas.microsoft.com/office/powerpoint/2010/main" val="3610051244"/>
       </p:ext>
     </p:extLst>
   </p:cSld>
@@ -3678,7 +3691,7 @@
           <p:cNvPr id="2" name="Title 1">
             <a:extLst>
               <a:ext uri="{FF2B5EF4-FFF2-40B4-BE49-F238E27FC236}">
-                <a16:creationId xmlns:a16="http://schemas.microsoft.com/office/drawing/2014/main" xmlns="" id="{9722BDA7-8BE9-42D5-ACF1-0F51423A206E}"/>
+                <a16:creationId xmlns:a16="http://schemas.microsoft.com/office/drawing/2014/main" id="{9722BDA7-8BE9-42D5-ACF1-0F51423A206E}"/>
               </a:ext>
             </a:extLst>
           </p:cNvPr>
@@ -3716,7 +3729,7 @@
           <p:cNvPr id="3" name="Text Placeholder 2">
             <a:extLst>
               <a:ext uri="{FF2B5EF4-FFF2-40B4-BE49-F238E27FC236}">
-                <a16:creationId xmlns:a16="http://schemas.microsoft.com/office/drawing/2014/main" xmlns="" id="{71CEF73F-3CCA-4312-8E9C-2B4629DA1F66}"/>
+                <a16:creationId xmlns:a16="http://schemas.microsoft.com/office/drawing/2014/main" id="{71CEF73F-3CCA-4312-8E9C-2B4629DA1F66}"/>
               </a:ext>
             </a:extLst>
           </p:cNvPr>
@@ -3841,7 +3854,7 @@
           <p:cNvPr id="4" name="Slide Number Placeholder 3">
             <a:extLst>
               <a:ext uri="{FF2B5EF4-FFF2-40B4-BE49-F238E27FC236}">
-                <a16:creationId xmlns:a16="http://schemas.microsoft.com/office/drawing/2014/main" xmlns="" id="{293BF716-502C-4821-A3A0-19C2C508EED1}"/>
+                <a16:creationId xmlns:a16="http://schemas.microsoft.com/office/drawing/2014/main" id="{293BF716-502C-4821-A3A0-19C2C508EED1}"/>
               </a:ext>
             </a:extLst>
           </p:cNvPr>
@@ -3873,7 +3886,7 @@
     </p:spTree>
     <p:extLst>
       <p:ext uri="{BB962C8B-B14F-4D97-AF65-F5344CB8AC3E}">
-        <p14:creationId xmlns:p14="http://schemas.microsoft.com/office/powerpoint/2010/main" xmlns="" val="2665983131"/>
+        <p14:creationId xmlns:p14="http://schemas.microsoft.com/office/powerpoint/2010/main" val="2665983131"/>
       </p:ext>
     </p:extLst>
   </p:cSld>
@@ -3916,7 +3929,7 @@
           <p:cNvPr id="5" name="Picture 4">
             <a:extLst>
               <a:ext uri="{FF2B5EF4-FFF2-40B4-BE49-F238E27FC236}">
-                <a16:creationId xmlns:a16="http://schemas.microsoft.com/office/drawing/2014/main" xmlns="" id="{448E4AFE-E166-4B84-B0C8-9205038D8033}"/>
+                <a16:creationId xmlns:a16="http://schemas.microsoft.com/office/drawing/2014/main" id="{448E4AFE-E166-4B84-B0C8-9205038D8033}"/>
               </a:ext>
             </a:extLst>
           </p:cNvPr>
@@ -3929,7 +3942,7 @@
           <a:blip r:embed="rId16" cstate="screen">
             <a:extLst>
               <a:ext uri="{28A0092B-C50C-407E-A947-70E740481C1C}">
-                <a14:useLocalDpi xmlns:a14="http://schemas.microsoft.com/office/drawing/2010/main" xmlns=""/>
+                <a14:useLocalDpi xmlns:a14="http://schemas.microsoft.com/office/drawing/2010/main"/>
               </a:ext>
             </a:extLst>
           </a:blip>
@@ -3952,7 +3965,7 @@
           <p:cNvPr id="2" name="Title Placeholder 1">
             <a:extLst>
               <a:ext uri="{FF2B5EF4-FFF2-40B4-BE49-F238E27FC236}">
-                <a16:creationId xmlns:a16="http://schemas.microsoft.com/office/drawing/2014/main" xmlns="" id="{6C617517-B672-49BA-AC6E-AB66D0639A58}"/>
+                <a16:creationId xmlns:a16="http://schemas.microsoft.com/office/drawing/2014/main" id="{6C617517-B672-49BA-AC6E-AB66D0639A58}"/>
               </a:ext>
             </a:extLst>
           </p:cNvPr>
@@ -3991,7 +4004,7 @@
           <p:cNvPr id="3" name="Text Placeholder 2">
             <a:extLst>
               <a:ext uri="{FF2B5EF4-FFF2-40B4-BE49-F238E27FC236}">
-                <a16:creationId xmlns:a16="http://schemas.microsoft.com/office/drawing/2014/main" xmlns="" id="{6EC92C27-7843-4B22-9200-B7304E6AE4CD}"/>
+                <a16:creationId xmlns:a16="http://schemas.microsoft.com/office/drawing/2014/main" id="{6EC92C27-7843-4B22-9200-B7304E6AE4CD}"/>
               </a:ext>
             </a:extLst>
           </p:cNvPr>
@@ -4059,7 +4072,7 @@
           <p:cNvPr id="6" name="Slide Number Placeholder 5">
             <a:extLst>
               <a:ext uri="{FF2B5EF4-FFF2-40B4-BE49-F238E27FC236}">
-                <a16:creationId xmlns:a16="http://schemas.microsoft.com/office/drawing/2014/main" xmlns="" id="{52DB4F10-F75B-41A8-B994-BFF68949E59A}"/>
+                <a16:creationId xmlns:a16="http://schemas.microsoft.com/office/drawing/2014/main" id="{52DB4F10-F75B-41A8-B994-BFF68949E59A}"/>
               </a:ext>
             </a:extLst>
           </p:cNvPr>
@@ -4115,7 +4128,7 @@
           <p:cNvPr id="7" name="Rectangle 6">
             <a:extLst>
               <a:ext uri="{FF2B5EF4-FFF2-40B4-BE49-F238E27FC236}">
-                <a16:creationId xmlns:a16="http://schemas.microsoft.com/office/drawing/2014/main" xmlns="" id="{512D21E2-8DEB-4F43-A26E-B8DA900A9230}"/>
+                <a16:creationId xmlns:a16="http://schemas.microsoft.com/office/drawing/2014/main" id="{512D21E2-8DEB-4F43-A26E-B8DA900A9230}"/>
               </a:ext>
             </a:extLst>
           </p:cNvPr>
@@ -4178,7 +4191,7 @@
           <p:cNvPr id="8" name="Rectangle 7">
             <a:extLst>
               <a:ext uri="{FF2B5EF4-FFF2-40B4-BE49-F238E27FC236}">
-                <a16:creationId xmlns:a16="http://schemas.microsoft.com/office/drawing/2014/main" xmlns="" id="{35CD3143-7FD1-40EA-AA4A-47C72380AEC2}"/>
+                <a16:creationId xmlns:a16="http://schemas.microsoft.com/office/drawing/2014/main" id="{35CD3143-7FD1-40EA-AA4A-47C72380AEC2}"/>
               </a:ext>
             </a:extLst>
           </p:cNvPr>
@@ -4228,7 +4241,7 @@
     </p:spTree>
     <p:extLst>
       <p:ext uri="{BB962C8B-B14F-4D97-AF65-F5344CB8AC3E}">
-        <p14:creationId xmlns:p14="http://schemas.microsoft.com/office/powerpoint/2010/main" xmlns="" val="3853920126"/>
+        <p14:creationId xmlns:p14="http://schemas.microsoft.com/office/powerpoint/2010/main" val="3853920126"/>
       </p:ext>
     </p:extLst>
   </p:cSld>
@@ -4558,7 +4571,7 @@
           <p:cNvPr id="4" name="Title 3">
             <a:extLst>
               <a:ext uri="{FF2B5EF4-FFF2-40B4-BE49-F238E27FC236}">
-                <a16:creationId xmlns:a16="http://schemas.microsoft.com/office/drawing/2014/main" xmlns="" id="{E10C5037-DA4A-44E2-A9FB-84B1498768A7}"/>
+                <a16:creationId xmlns:a16="http://schemas.microsoft.com/office/drawing/2014/main" id="{E10C5037-DA4A-44E2-A9FB-84B1498768A7}"/>
               </a:ext>
             </a:extLst>
           </p:cNvPr>
@@ -4595,7 +4608,7 @@
           <p:cNvPr id="15" name="Slide Number Placeholder 14">
             <a:extLst>
               <a:ext uri="{FF2B5EF4-FFF2-40B4-BE49-F238E27FC236}">
-                <a16:creationId xmlns:a16="http://schemas.microsoft.com/office/drawing/2014/main" xmlns="" id="{26F5C050-EB87-421A-8A5C-E6CB30102699}"/>
+                <a16:creationId xmlns:a16="http://schemas.microsoft.com/office/drawing/2014/main" id="{26F5C050-EB87-421A-8A5C-E6CB30102699}"/>
               </a:ext>
             </a:extLst>
           </p:cNvPr>
@@ -4629,7 +4642,7 @@
           <p:cNvPr id="29" name="Picture Placeholder 28" descr="Young student drawing on a whiteboard">
             <a:extLst>
               <a:ext uri="{FF2B5EF4-FFF2-40B4-BE49-F238E27FC236}">
-                <a16:creationId xmlns:a16="http://schemas.microsoft.com/office/drawing/2014/main" xmlns="" id="{AE2FE2E9-1D1E-404B-A659-DD19B5D66B5B}"/>
+                <a16:creationId xmlns:a16="http://schemas.microsoft.com/office/drawing/2014/main" id="{AE2FE2E9-1D1E-404B-A659-DD19B5D66B5B}"/>
               </a:ext>
             </a:extLst>
           </p:cNvPr>
@@ -4644,7 +4657,7 @@
           <a:blip r:embed="rId2" cstate="screen">
             <a:extLst>
               <a:ext uri="{28A0092B-C50C-407E-A947-70E740481C1C}">
-                <a14:useLocalDpi xmlns:a14="http://schemas.microsoft.com/office/drawing/2010/main" xmlns=""/>
+                <a14:useLocalDpi xmlns:a14="http://schemas.microsoft.com/office/drawing/2010/main"/>
               </a:ext>
             </a:extLst>
           </a:blip>
@@ -4663,7 +4676,7 @@
     </p:spTree>
     <p:extLst>
       <p:ext uri="{BB962C8B-B14F-4D97-AF65-F5344CB8AC3E}">
-        <p14:creationId xmlns:p14="http://schemas.microsoft.com/office/powerpoint/2010/main" xmlns="" val="1136250268"/>
+        <p14:creationId xmlns:p14="http://schemas.microsoft.com/office/powerpoint/2010/main" val="1136250268"/>
       </p:ext>
     </p:extLst>
   </p:cSld>
@@ -4712,7 +4725,7 @@
           <p:cNvPr id="2" name="Title 1">
             <a:extLst>
               <a:ext uri="{FF2B5EF4-FFF2-40B4-BE49-F238E27FC236}">
-                <a16:creationId xmlns:a16="http://schemas.microsoft.com/office/drawing/2014/main" xmlns="" id="{E199600F-A17E-4354-A7AB-0CC2A43A9354}"/>
+                <a16:creationId xmlns:a16="http://schemas.microsoft.com/office/drawing/2014/main" id="{E199600F-A17E-4354-A7AB-0CC2A43A9354}"/>
               </a:ext>
             </a:extLst>
           </p:cNvPr>
@@ -4747,7 +4760,7 @@
           <p:cNvPr id="3" name="Content Placeholder 2">
             <a:extLst>
               <a:ext uri="{FF2B5EF4-FFF2-40B4-BE49-F238E27FC236}">
-                <a16:creationId xmlns:a16="http://schemas.microsoft.com/office/drawing/2014/main" xmlns="" id="{FA6A4B49-27C8-46B6-8B11-AD7E8F615E2C}"/>
+                <a16:creationId xmlns:a16="http://schemas.microsoft.com/office/drawing/2014/main" id="{FA6A4B49-27C8-46B6-8B11-AD7E8F615E2C}"/>
               </a:ext>
             </a:extLst>
           </p:cNvPr>
@@ -4770,6 +4783,9 @@
           </a:bodyPr>
           <a:lstStyle/>
           <a:p>
+            <a:pPr marL="0" indent="0" algn="ctr">
+              <a:buNone/>
+            </a:pPr>
             <a:r>
               <a:rPr lang="en-US" noProof="1" smtClean="0"/>
               <a:t>A computer understands 0 &amp; 1 i.e. binary.</a:t>
@@ -4785,7 +4801,7 @@
           <p:cNvPr id="4" name="Slide Number Placeholder 3">
             <a:extLst>
               <a:ext uri="{FF2B5EF4-FFF2-40B4-BE49-F238E27FC236}">
-                <a16:creationId xmlns:a16="http://schemas.microsoft.com/office/drawing/2014/main" xmlns="" id="{62B4CE3A-8C88-45AA-A849-57E5A7AC22C1}"/>
+                <a16:creationId xmlns:a16="http://schemas.microsoft.com/office/drawing/2014/main" id="{62B4CE3A-8C88-45AA-A849-57E5A7AC22C1}"/>
               </a:ext>
             </a:extLst>
           </p:cNvPr>
@@ -4824,10 +4840,10 @@
           <p:cNvPr id="11" name="Rectangle 10">
             <a:extLst>
               <a:ext uri="{FF2B5EF4-FFF2-40B4-BE49-F238E27FC236}">
-                <a16:creationId xmlns:a16="http://schemas.microsoft.com/office/drawing/2014/main" xmlns="" id="{5F253864-26FA-4AB1-9F0A-4F57D870EE85}"/>
+                <a16:creationId xmlns:a16="http://schemas.microsoft.com/office/drawing/2014/main" id="{5F253864-26FA-4AB1-9F0A-4F57D870EE85}"/>
               </a:ext>
               <a:ext uri="{C183D7F6-B498-43B3-948B-1728B52AA6E4}">
-                <adec:decorative xmlns="" xmlns:adec="http://schemas.microsoft.com/office/drawing/2017/decorative" val="1"/>
+                <adec:decorative xmlns:adec="http://schemas.microsoft.com/office/drawing/2017/decorative" xmlns="" val="1"/>
               </a:ext>
             </a:extLst>
           </p:cNvPr>
@@ -4889,7 +4905,7 @@
           <a:blip r:embed="rId2">
             <a:extLst>
               <a:ext uri="{28A0092B-C50C-407E-A947-70E740481C1C}">
-                <a14:useLocalDpi xmlns:a14="http://schemas.microsoft.com/office/drawing/2010/main" xmlns="" val="0"/>
+                <a14:useLocalDpi xmlns:a14="http://schemas.microsoft.com/office/drawing/2010/main" val="0"/>
               </a:ext>
             </a:extLst>
           </a:blip>
@@ -4899,7 +4915,7 @@
         </p:blipFill>
         <p:spPr>
           <a:xfrm>
-            <a:off x="1625600" y="2420968"/>
+            <a:off x="1625600" y="2430204"/>
             <a:ext cx="8056880" cy="3829101"/>
           </a:xfrm>
           <a:prstGeom prst="rect">
@@ -4910,7 +4926,7 @@
     </p:spTree>
     <p:extLst>
       <p:ext uri="{BB962C8B-B14F-4D97-AF65-F5344CB8AC3E}">
-        <p14:creationId xmlns:p14="http://schemas.microsoft.com/office/powerpoint/2010/main" xmlns="" val="468055030"/>
+        <p14:creationId xmlns:p14="http://schemas.microsoft.com/office/powerpoint/2010/main" val="468055030"/>
       </p:ext>
     </p:extLst>
   </p:cSld>
@@ -4949,7 +4965,7 @@
           <p:cNvPr id="2" name="Title 1">
             <a:extLst>
               <a:ext uri="{FF2B5EF4-FFF2-40B4-BE49-F238E27FC236}">
-                <a16:creationId xmlns:a16="http://schemas.microsoft.com/office/drawing/2014/main" xmlns="" id="{E199600F-A17E-4354-A7AB-0CC2A43A9354}"/>
+                <a16:creationId xmlns:a16="http://schemas.microsoft.com/office/drawing/2014/main" id="{E199600F-A17E-4354-A7AB-0CC2A43A9354}"/>
               </a:ext>
             </a:extLst>
           </p:cNvPr>
@@ -4984,7 +5000,7 @@
           <p:cNvPr id="3" name="Content Placeholder 2">
             <a:extLst>
               <a:ext uri="{FF2B5EF4-FFF2-40B4-BE49-F238E27FC236}">
-                <a16:creationId xmlns:a16="http://schemas.microsoft.com/office/drawing/2014/main" xmlns="" id="{FA6A4B49-27C8-46B6-8B11-AD7E8F615E2C}"/>
+                <a16:creationId xmlns:a16="http://schemas.microsoft.com/office/drawing/2014/main" id="{FA6A4B49-27C8-46B6-8B11-AD7E8F615E2C}"/>
               </a:ext>
             </a:extLst>
           </p:cNvPr>
@@ -5007,9 +5023,12 @@
           </a:bodyPr>
           <a:lstStyle/>
           <a:p>
+            <a:pPr marL="0" indent="0" algn="ctr">
+              <a:buNone/>
+            </a:pPr>
             <a:r>
               <a:rPr lang="en-US" noProof="1" smtClean="0"/>
-              <a:t>Humans understand and communicate in their own languages like Hindi, English,French etc.</a:t>
+              <a:t>Humans understand and communicate in their own languages like Hindi, English,French</a:t>
             </a:r>
             <a:br>
               <a:rPr lang="en-US" noProof="1" smtClean="0"/>
@@ -5026,7 +5045,7 @@
           <p:cNvPr id="4" name="Slide Number Placeholder 3">
             <a:extLst>
               <a:ext uri="{FF2B5EF4-FFF2-40B4-BE49-F238E27FC236}">
-                <a16:creationId xmlns:a16="http://schemas.microsoft.com/office/drawing/2014/main" xmlns="" id="{62B4CE3A-8C88-45AA-A849-57E5A7AC22C1}"/>
+                <a16:creationId xmlns:a16="http://schemas.microsoft.com/office/drawing/2014/main" id="{62B4CE3A-8C88-45AA-A849-57E5A7AC22C1}"/>
               </a:ext>
             </a:extLst>
           </p:cNvPr>
@@ -5065,10 +5084,10 @@
           <p:cNvPr id="11" name="Rectangle 10">
             <a:extLst>
               <a:ext uri="{FF2B5EF4-FFF2-40B4-BE49-F238E27FC236}">
-                <a16:creationId xmlns:a16="http://schemas.microsoft.com/office/drawing/2014/main" xmlns="" id="{5F253864-26FA-4AB1-9F0A-4F57D870EE85}"/>
+                <a16:creationId xmlns:a16="http://schemas.microsoft.com/office/drawing/2014/main" id="{5F253864-26FA-4AB1-9F0A-4F57D870EE85}"/>
               </a:ext>
               <a:ext uri="{C183D7F6-B498-43B3-948B-1728B52AA6E4}">
-                <adec:decorative xmlns="" xmlns:adec="http://schemas.microsoft.com/office/drawing/2017/decorative" val="1"/>
+                <adec:decorative xmlns:adec="http://schemas.microsoft.com/office/drawing/2017/decorative" xmlns="" val="1"/>
               </a:ext>
             </a:extLst>
           </p:cNvPr>
@@ -5130,7 +5149,7 @@
           <a:blip r:embed="rId2">
             <a:extLst>
               <a:ext uri="{28A0092B-C50C-407E-A947-70E740481C1C}">
-                <a14:useLocalDpi xmlns:a14="http://schemas.microsoft.com/office/drawing/2010/main" xmlns="" val="0"/>
+                <a14:useLocalDpi xmlns:a14="http://schemas.microsoft.com/office/drawing/2010/main" val="0"/>
               </a:ext>
             </a:extLst>
           </a:blip>
@@ -5151,7 +5170,7 @@
     </p:spTree>
     <p:extLst>
       <p:ext uri="{BB962C8B-B14F-4D97-AF65-F5344CB8AC3E}">
-        <p14:creationId xmlns:p14="http://schemas.microsoft.com/office/powerpoint/2010/main" xmlns="" val="2066184693"/>
+        <p14:creationId xmlns:p14="http://schemas.microsoft.com/office/powerpoint/2010/main" val="2066184693"/>
       </p:ext>
     </p:extLst>
   </p:cSld>
@@ -5190,7 +5209,7 @@
           <p:cNvPr id="2" name="Title 1">
             <a:extLst>
               <a:ext uri="{FF2B5EF4-FFF2-40B4-BE49-F238E27FC236}">
-                <a16:creationId xmlns:a16="http://schemas.microsoft.com/office/drawing/2014/main" xmlns="" id="{E199600F-A17E-4354-A7AB-0CC2A43A9354}"/>
+                <a16:creationId xmlns:a16="http://schemas.microsoft.com/office/drawing/2014/main" id="{E199600F-A17E-4354-A7AB-0CC2A43A9354}"/>
               </a:ext>
             </a:extLst>
           </p:cNvPr>
@@ -5204,7 +5223,7 @@
         <p:spPr>
           <a:xfrm>
             <a:off x="838200" y="611081"/>
-            <a:ext cx="9291320" cy="833663"/>
+            <a:ext cx="10515600" cy="833663"/>
           </a:xfrm>
         </p:spPr>
         <p:txBody>
@@ -5214,11 +5233,7 @@
             <a:pPr algn="ctr"/>
             <a:r>
               <a:rPr lang="en-US" dirty="0" smtClean="0"/>
-              <a:t>Programming </a:t>
-            </a:r>
-            <a:r>
-              <a:rPr lang="en-US" dirty="0" smtClean="0"/>
-              <a:t>Languages </a:t>
+              <a:t>Programming Languages </a:t>
             </a:r>
             <a:endParaRPr lang="en-US" dirty="0"/>
           </a:p>
@@ -5229,7 +5244,7 @@
           <p:cNvPr id="3" name="Content Placeholder 2">
             <a:extLst>
               <a:ext uri="{FF2B5EF4-FFF2-40B4-BE49-F238E27FC236}">
-                <a16:creationId xmlns:a16="http://schemas.microsoft.com/office/drawing/2014/main" xmlns="" id="{FA6A4B49-27C8-46B6-8B11-AD7E8F615E2C}"/>
+                <a16:creationId xmlns:a16="http://schemas.microsoft.com/office/drawing/2014/main" id="{FA6A4B49-27C8-46B6-8B11-AD7E8F615E2C}"/>
               </a:ext>
             </a:extLst>
           </p:cNvPr>
@@ -5254,7 +5269,7 @@
           <a:p>
             <a:r>
               <a:rPr lang="en-US" noProof="1" smtClean="0"/>
-              <a:t>In order for the  humans to interact with the computer we need a programming language which both a computer and a human unserstand and are well versed with.</a:t>
+              <a:t>In order for the  humans to interact with the computer we need a programming language which both a computer and a human understand and are well versed with.</a:t>
             </a:r>
             <a:br>
               <a:rPr lang="en-US" noProof="1" smtClean="0"/>
@@ -5278,7 +5293,7 @@
           <p:cNvPr id="4" name="Slide Number Placeholder 3">
             <a:extLst>
               <a:ext uri="{FF2B5EF4-FFF2-40B4-BE49-F238E27FC236}">
-                <a16:creationId xmlns:a16="http://schemas.microsoft.com/office/drawing/2014/main" xmlns="" id="{62B4CE3A-8C88-45AA-A849-57E5A7AC22C1}"/>
+                <a16:creationId xmlns:a16="http://schemas.microsoft.com/office/drawing/2014/main" id="{62B4CE3A-8C88-45AA-A849-57E5A7AC22C1}"/>
               </a:ext>
             </a:extLst>
           </p:cNvPr>
@@ -5317,10 +5332,10 @@
           <p:cNvPr id="11" name="Rectangle 10">
             <a:extLst>
               <a:ext uri="{FF2B5EF4-FFF2-40B4-BE49-F238E27FC236}">
-                <a16:creationId xmlns:a16="http://schemas.microsoft.com/office/drawing/2014/main" xmlns="" id="{5F253864-26FA-4AB1-9F0A-4F57D870EE85}"/>
+                <a16:creationId xmlns:a16="http://schemas.microsoft.com/office/drawing/2014/main" id="{5F253864-26FA-4AB1-9F0A-4F57D870EE85}"/>
               </a:ext>
               <a:ext uri="{C183D7F6-B498-43B3-948B-1728B52AA6E4}">
-                <adec:decorative xmlns="" xmlns:adec="http://schemas.microsoft.com/office/drawing/2017/decorative" val="1"/>
+                <adec:decorative xmlns:adec="http://schemas.microsoft.com/office/drawing/2017/decorative" xmlns="" val="1"/>
               </a:ext>
             </a:extLst>
           </p:cNvPr>
@@ -5382,7 +5397,7 @@
           <a:blip r:embed="rId2">
             <a:extLst>
               <a:ext uri="{28A0092B-C50C-407E-A947-70E740481C1C}">
-                <a14:useLocalDpi xmlns:a14="http://schemas.microsoft.com/office/drawing/2010/main" xmlns="" val="0"/>
+                <a14:useLocalDpi xmlns:a14="http://schemas.microsoft.com/office/drawing/2010/main" val="0"/>
               </a:ext>
             </a:extLst>
           </a:blip>
@@ -5392,7 +5407,7 @@
         </p:blipFill>
         <p:spPr>
           <a:xfrm>
-            <a:off x="1059970" y="2488533"/>
+            <a:off x="1808115" y="2489740"/>
             <a:ext cx="9069550" cy="4051735"/>
           </a:xfrm>
           <a:prstGeom prst="rect">
@@ -5403,7 +5418,7 @@
     </p:spTree>
     <p:extLst>
       <p:ext uri="{BB962C8B-B14F-4D97-AF65-F5344CB8AC3E}">
-        <p14:creationId xmlns:p14="http://schemas.microsoft.com/office/powerpoint/2010/main" xmlns="" val="4264094232"/>
+        <p14:creationId xmlns:p14="http://schemas.microsoft.com/office/powerpoint/2010/main" val="4264094232"/>
       </p:ext>
     </p:extLst>
   </p:cSld>
@@ -5439,13 +5454,7 @@
       </p:grpSpPr>
       <p:sp>
         <p:nvSpPr>
-          <p:cNvPr id="2" name="Title 1">
-            <a:extLst>
-              <a:ext uri="{FF2B5EF4-FFF2-40B4-BE49-F238E27FC236}">
-                <a16:creationId xmlns:a16="http://schemas.microsoft.com/office/drawing/2014/main" xmlns="" id="{C8F58AE6-56F6-44E8-8BBF-23277B1773E4}"/>
-              </a:ext>
-            </a:extLst>
-          </p:cNvPr>
+          <p:cNvPr id="2" name="Title 1"/>
           <p:cNvSpPr>
             <a:spLocks noGrp="1"/>
           </p:cNvSpPr>
@@ -5453,15 +5462,20 @@
             <p:ph type="title"/>
           </p:nvPr>
         </p:nvSpPr>
-        <p:spPr/>
+        <p:spPr>
+          <a:xfrm>
+            <a:off x="838200" y="611076"/>
+            <a:ext cx="10282382" cy="833663"/>
+          </a:xfrm>
+        </p:spPr>
         <p:txBody>
           <a:bodyPr/>
           <a:lstStyle/>
           <a:p>
             <a:pPr algn="ctr"/>
             <a:r>
-              <a:rPr lang="en-US" smtClean="0"/>
-              <a:t>Questions ??</a:t>
+              <a:rPr lang="en-US" dirty="0" smtClean="0"/>
+              <a:t>Java</a:t>
             </a:r>
             <a:endParaRPr lang="en-US" dirty="0"/>
           </a:p>
@@ -5469,7 +5483,7 @@
       </p:sp>
       <p:pic>
         <p:nvPicPr>
-          <p:cNvPr id="3" name="Content Placeholder 2"/>
+          <p:cNvPr id="5" name="Content Placeholder 4"/>
           <p:cNvPicPr>
             <a:picLocks noGrp="1" noChangeAspect="1"/>
           </p:cNvPicPr>
@@ -5481,7 +5495,7 @@
           <a:blip r:embed="rId2">
             <a:extLst>
               <a:ext uri="{28A0092B-C50C-407E-A947-70E740481C1C}">
-                <a14:useLocalDpi xmlns:a14="http://schemas.microsoft.com/office/drawing/2010/main" xmlns="" val="0"/>
+                <a14:useLocalDpi xmlns:a14="http://schemas.microsoft.com/office/drawing/2010/main" val="0"/>
               </a:ext>
             </a:extLst>
           </a:blip>
@@ -5491,20 +5505,14 @@
         </p:blipFill>
         <p:spPr>
           <a:xfrm>
-            <a:off x="4705350" y="1487686"/>
-            <a:ext cx="6648450" cy="3739753"/>
+            <a:off x="5909912" y="2115129"/>
+            <a:ext cx="1106905" cy="2466496"/>
           </a:xfrm>
         </p:spPr>
       </p:pic>
       <p:sp>
         <p:nvSpPr>
-          <p:cNvPr id="20" name="Slide Number Placeholder 19">
-            <a:extLst>
-              <a:ext uri="{FF2B5EF4-FFF2-40B4-BE49-F238E27FC236}">
-                <a16:creationId xmlns:a16="http://schemas.microsoft.com/office/drawing/2014/main" xmlns="" id="{3AEC0301-E9AA-4478-9E23-C372DBDCE653}"/>
-              </a:ext>
-            </a:extLst>
-          </p:cNvPr>
+          <p:cNvPr id="4" name="Slide Number Placeholder 3"/>
           <p:cNvSpPr>
             <a:spLocks noGrp="1"/>
           </p:cNvSpPr>
@@ -5512,18 +5520,13 @@
             <p:ph type="sldNum" sz="quarter" idx="10"/>
           </p:nvPr>
         </p:nvSpPr>
-        <p:spPr>
-          <a:xfrm>
-            <a:off x="10717695" y="6363134"/>
-            <a:ext cx="838200" cy="360000"/>
-          </a:xfrm>
-        </p:spPr>
+        <p:spPr/>
         <p:txBody>
           <a:bodyPr/>
           <a:lstStyle/>
           <a:p>
             <a:r>
-              <a:rPr lang="en-US" dirty="0"/>
+              <a:rPr lang="en-US" smtClean="0"/>
               <a:t>PAGE </a:t>
             </a:r>
             <a:fld id="{4A9B5881-4007-4345-955A-79C2656F0C49}" type="slidenum">
@@ -5535,15 +5538,225 @@
           </a:p>
         </p:txBody>
       </p:sp>
-      <p:sp>
-        <p:nvSpPr>
-          <p:cNvPr id="10" name="Isosceles Triangle 9">
-            <a:extLst>
-              <a:ext uri="{FF2B5EF4-FFF2-40B4-BE49-F238E27FC236}">
-                <a16:creationId xmlns:a16="http://schemas.microsoft.com/office/drawing/2014/main" xmlns="" id="{792980D7-ED01-4955-83DB-59BA18C94FBA}"/>
+    </p:spTree>
+    <p:extLst>
+      <p:ext uri="{BB962C8B-B14F-4D97-AF65-F5344CB8AC3E}">
+        <p14:creationId xmlns:p14="http://schemas.microsoft.com/office/powerpoint/2010/main" val="3319381857"/>
+      </p:ext>
+    </p:extLst>
+  </p:cSld>
+  <p:clrMapOvr>
+    <a:masterClrMapping/>
+  </p:clrMapOvr>
+  <p:timing>
+    <p:tnLst>
+      <p:par>
+        <p:cTn id="1" dur="indefinite" restart="never" nodeType="tmRoot"/>
+      </p:par>
+    </p:tnLst>
+  </p:timing>
+</p:sld>
+</file>
+
+<file path=ppt/slides/slide6.xml><?xml version="1.0" encoding="utf-8"?>
+<p:sld xmlns:a="http://schemas.openxmlformats.org/drawingml/2006/main" xmlns:r="http://schemas.openxmlformats.org/officeDocument/2006/relationships" xmlns:p="http://schemas.openxmlformats.org/presentationml/2006/main">
+  <p:cSld>
+    <p:spTree>
+      <p:nvGrpSpPr>
+        <p:cNvPr id="1" name=""/>
+        <p:cNvGrpSpPr/>
+        <p:nvPr/>
+      </p:nvGrpSpPr>
+      <p:grpSpPr>
+        <a:xfrm>
+          <a:off x="0" y="0"/>
+          <a:ext cx="0" cy="0"/>
+          <a:chOff x="0" y="0"/>
+          <a:chExt cx="0" cy="0"/>
+        </a:xfrm>
+      </p:grpSpPr>
+      <p:sp>
+        <p:nvSpPr>
+          <p:cNvPr id="2" name="Title 1">
+            <a:extLst>
+              <a:ext uri="{FF2B5EF4-FFF2-40B4-BE49-F238E27FC236}">
+                <a16:creationId xmlns:a16="http://schemas.microsoft.com/office/drawing/2014/main" id="{E199600F-A17E-4354-A7AB-0CC2A43A9354}"/>
+              </a:ext>
+            </a:extLst>
+          </p:cNvPr>
+          <p:cNvSpPr>
+            <a:spLocks noGrp="1"/>
+          </p:cNvSpPr>
+          <p:nvPr>
+            <p:ph type="title"/>
+          </p:nvPr>
+        </p:nvSpPr>
+        <p:spPr>
+          <a:xfrm>
+            <a:off x="838200" y="611081"/>
+            <a:ext cx="10515600" cy="833663"/>
+          </a:xfrm>
+        </p:spPr>
+        <p:txBody>
+          <a:bodyPr/>
+          <a:lstStyle/>
+          <a:p>
+            <a:pPr algn="ctr"/>
+            <a:r>
+              <a:rPr lang="en-US" dirty="0" smtClean="0"/>
+              <a:t>Java Programming Language </a:t>
+            </a:r>
+            <a:endParaRPr lang="en-US" dirty="0"/>
+          </a:p>
+        </p:txBody>
+      </p:sp>
+      <p:sp>
+        <p:nvSpPr>
+          <p:cNvPr id="3" name="Content Placeholder 2">
+            <a:extLst>
+              <a:ext uri="{FF2B5EF4-FFF2-40B4-BE49-F238E27FC236}">
+                <a16:creationId xmlns:a16="http://schemas.microsoft.com/office/drawing/2014/main" id="{FA6A4B49-27C8-46B6-8B11-AD7E8F615E2C}"/>
+              </a:ext>
+            </a:extLst>
+          </p:cNvPr>
+          <p:cNvSpPr>
+            <a:spLocks noGrp="1"/>
+          </p:cNvSpPr>
+          <p:nvPr>
+            <p:ph idx="1"/>
+          </p:nvPr>
+        </p:nvSpPr>
+        <p:spPr>
+          <a:xfrm>
+            <a:off x="838200" y="1825625"/>
+            <a:ext cx="10515600" cy="4351338"/>
+          </a:xfrm>
+        </p:spPr>
+        <p:txBody>
+          <a:bodyPr>
+            <a:normAutofit fontScale="92500" lnSpcReduction="10000"/>
+          </a:bodyPr>
+          <a:lstStyle/>
+          <a:p>
+            <a:endParaRPr lang="en-US" noProof="1" smtClean="0"/>
+          </a:p>
+          <a:p>
+            <a:r>
+              <a:rPr lang="en-US" noProof="1" smtClean="0"/>
+              <a:t>One </a:t>
+            </a:r>
+            <a:r>
+              <a:rPr lang="en-US" noProof="1" smtClean="0"/>
+              <a:t>such language that we are studying in this course is Java.</a:t>
+            </a:r>
+          </a:p>
+          <a:p>
+            <a:r>
+              <a:rPr lang="en-US" noProof="1" smtClean="0"/>
+              <a:t>Java language project was initiated by James Gosling, Mike Sheridan and Patrick Naughton at Sun Microsystems.</a:t>
+            </a:r>
+          </a:p>
+          <a:p>
+            <a:r>
+              <a:rPr lang="en-US" noProof="1" smtClean="0"/>
+              <a:t>The language was initially known as Oak owing to the Oak tree that stood outside of James Goslings office. It later got renamed to project Green and finally Java after Java coffee, the coffee from Indonesia.</a:t>
+            </a:r>
+          </a:p>
+          <a:p>
+            <a:r>
+              <a:rPr lang="en-US" noProof="1" smtClean="0"/>
+              <a:t>Syntax </a:t>
+            </a:r>
+            <a:r>
+              <a:rPr lang="en-US" noProof="1" smtClean="0"/>
+              <a:t>of Java is largely influenced by C/C++ syntax</a:t>
+            </a:r>
+            <a:r>
+              <a:rPr lang="en-US" noProof="1" smtClean="0"/>
+              <a:t>.</a:t>
+            </a:r>
+          </a:p>
+          <a:p>
+            <a:r>
+              <a:rPr lang="en-US" noProof="1"/>
+              <a:t>One of the key features was that it was Write once,run anywhere(WORA) piece of software. This meant a Java program could be run on a wide variety of machines without having to compile it </a:t>
+            </a:r>
+            <a:r>
+              <a:rPr lang="en-US" noProof="1"/>
+              <a:t>again</a:t>
+            </a:r>
+            <a:r>
+              <a:rPr lang="en-US" noProof="1" smtClean="0"/>
+              <a:t>.</a:t>
+            </a:r>
+            <a:endParaRPr lang="en-US" noProof="1" smtClean="0"/>
+          </a:p>
+          <a:p>
+            <a:r>
+              <a:rPr lang="en-US" noProof="1" smtClean="0"/>
+              <a:t>Java was initially owned by Sun Microsystems but gradually it got acquired by Oracle Corporation in the year.</a:t>
+            </a:r>
+          </a:p>
+          <a:p>
+            <a:pPr marL="0" indent="0">
+              <a:buNone/>
+            </a:pPr>
+            <a:r>
+              <a:rPr lang="en-US" noProof="1" smtClean="0"/>
+              <a:t> </a:t>
+            </a:r>
+            <a:endParaRPr lang="en-US" noProof="1" smtClean="0"/>
+          </a:p>
+        </p:txBody>
+      </p:sp>
+      <p:sp>
+        <p:nvSpPr>
+          <p:cNvPr id="4" name="Slide Number Placeholder 3">
+            <a:extLst>
+              <a:ext uri="{FF2B5EF4-FFF2-40B4-BE49-F238E27FC236}">
+                <a16:creationId xmlns:a16="http://schemas.microsoft.com/office/drawing/2014/main" id="{62B4CE3A-8C88-45AA-A849-57E5A7AC22C1}"/>
+              </a:ext>
+            </a:extLst>
+          </p:cNvPr>
+          <p:cNvSpPr>
+            <a:spLocks noGrp="1"/>
+          </p:cNvSpPr>
+          <p:nvPr>
+            <p:ph type="sldNum" sz="quarter" idx="10"/>
+          </p:nvPr>
+        </p:nvSpPr>
+        <p:spPr>
+          <a:xfrm>
+            <a:off x="11353800" y="6361475"/>
+            <a:ext cx="838200" cy="360000"/>
+          </a:xfrm>
+        </p:spPr>
+        <p:txBody>
+          <a:bodyPr/>
+          <a:lstStyle/>
+          <a:p>
+            <a:r>
+              <a:rPr lang="en-US" dirty="0"/>
+              <a:t>PAGE </a:t>
+            </a:r>
+            <a:fld id="{4A9B5881-4007-4345-955A-79C2656F0C49}" type="slidenum">
+              <a:rPr lang="en-US" smtClean="0"/>
+              <a:pPr/>
+              <a:t>6</a:t>
+            </a:fld>
+            <a:endParaRPr lang="en-US" dirty="0"/>
+          </a:p>
+        </p:txBody>
+      </p:sp>
+      <p:sp>
+        <p:nvSpPr>
+          <p:cNvPr id="11" name="Rectangle 10">
+            <a:extLst>
+              <a:ext uri="{FF2B5EF4-FFF2-40B4-BE49-F238E27FC236}">
+                <a16:creationId xmlns:a16="http://schemas.microsoft.com/office/drawing/2014/main" id="{5F253864-26FA-4AB1-9F0A-4F57D870EE85}"/>
               </a:ext>
               <a:ext uri="{C183D7F6-B498-43B3-948B-1728B52AA6E4}">
-                <adec:decorative xmlns="" xmlns:adec="http://schemas.microsoft.com/office/drawing/2017/decorative" val="1"/>
+                <adec:decorative xmlns:adec="http://schemas.microsoft.com/office/drawing/2017/decorative" xmlns="" val="1"/>
               </a:ext>
             </a:extLst>
           </p:cNvPr>
@@ -5551,15 +5764,18 @@
           <p:nvPr/>
         </p:nvSpPr>
         <p:spPr>
-          <a:xfrm rot="10800000">
-            <a:off x="10006315" y="6271566"/>
-            <a:ext cx="142847" cy="91567"/>
-          </a:xfrm>
-          <a:prstGeom prst="triangle">
+          <a:xfrm>
+            <a:off x="6249555" y="6562004"/>
+            <a:ext cx="2552123" cy="159471"/>
+          </a:xfrm>
+          <a:prstGeom prst="rect">
             <a:avLst/>
           </a:prstGeom>
           <a:solidFill>
-            <a:schemeClr val="bg1"/>
+            <a:schemeClr val="tx1">
+              <a:lumMod val="85000"/>
+              <a:lumOff val="15000"/>
+            </a:schemeClr>
           </a:solidFill>
           <a:ln>
             <a:noFill/>
@@ -5582,18 +5798,208 @@
           </a:fontRef>
         </p:style>
         <p:txBody>
-          <a:bodyPr rtlCol="0" anchor="ctr"/>
+          <a:bodyPr anchor="ctr"/>
           <a:lstStyle/>
           <a:p>
             <a:pPr algn="ctr"/>
-            <a:endParaRPr lang="en-US" dirty="0"/>
+            <a:endParaRPr lang="en-US" sz="1200" dirty="0"/>
           </a:p>
         </p:txBody>
       </p:sp>
     </p:spTree>
     <p:extLst>
       <p:ext uri="{BB962C8B-B14F-4D97-AF65-F5344CB8AC3E}">
-        <p14:creationId xmlns:p14="http://schemas.microsoft.com/office/powerpoint/2010/main" xmlns="" val="613291450"/>
+        <p14:creationId xmlns:p14="http://schemas.microsoft.com/office/powerpoint/2010/main" val="4113418518"/>
+      </p:ext>
+    </p:extLst>
+  </p:cSld>
+  <p:clrMapOvr>
+    <a:masterClrMapping/>
+  </p:clrMapOvr>
+  <p:timing>
+    <p:tnLst>
+      <p:par>
+        <p:cTn id="1" dur="indefinite" restart="never" nodeType="tmRoot"/>
+      </p:par>
+    </p:tnLst>
+  </p:timing>
+</p:sld>
+</file>
+
+<file path=ppt/slides/slide7.xml><?xml version="1.0" encoding="utf-8"?>
+<p:sld xmlns:a="http://schemas.openxmlformats.org/drawingml/2006/main" xmlns:r="http://schemas.openxmlformats.org/officeDocument/2006/relationships" xmlns:p="http://schemas.openxmlformats.org/presentationml/2006/main">
+  <p:cSld>
+    <p:spTree>
+      <p:nvGrpSpPr>
+        <p:cNvPr id="1" name=""/>
+        <p:cNvGrpSpPr/>
+        <p:nvPr/>
+      </p:nvGrpSpPr>
+      <p:grpSpPr>
+        <a:xfrm>
+          <a:off x="0" y="0"/>
+          <a:ext cx="0" cy="0"/>
+          <a:chOff x="0" y="0"/>
+          <a:chExt cx="0" cy="0"/>
+        </a:xfrm>
+      </p:grpSpPr>
+      <p:sp>
+        <p:nvSpPr>
+          <p:cNvPr id="2" name="Title 1">
+            <a:extLst>
+              <a:ext uri="{FF2B5EF4-FFF2-40B4-BE49-F238E27FC236}">
+                <a16:creationId xmlns:a16="http://schemas.microsoft.com/office/drawing/2014/main" id="{C8F58AE6-56F6-44E8-8BBF-23277B1773E4}"/>
+              </a:ext>
+            </a:extLst>
+          </p:cNvPr>
+          <p:cNvSpPr>
+            <a:spLocks noGrp="1"/>
+          </p:cNvSpPr>
+          <p:nvPr>
+            <p:ph type="title"/>
+          </p:nvPr>
+        </p:nvSpPr>
+        <p:spPr/>
+        <p:txBody>
+          <a:bodyPr/>
+          <a:lstStyle/>
+          <a:p>
+            <a:pPr algn="ctr"/>
+            <a:r>
+              <a:rPr lang="en-US" smtClean="0"/>
+              <a:t>Questions ??</a:t>
+            </a:r>
+            <a:endParaRPr lang="en-US" dirty="0"/>
+          </a:p>
+        </p:txBody>
+      </p:sp>
+      <p:pic>
+        <p:nvPicPr>
+          <p:cNvPr id="3" name="Content Placeholder 2"/>
+          <p:cNvPicPr>
+            <a:picLocks noGrp="1" noChangeAspect="1"/>
+          </p:cNvPicPr>
+          <p:nvPr>
+            <p:ph idx="1"/>
+          </p:nvPr>
+        </p:nvPicPr>
+        <p:blipFill>
+          <a:blip r:embed="rId2">
+            <a:extLst>
+              <a:ext uri="{28A0092B-C50C-407E-A947-70E740481C1C}">
+                <a14:useLocalDpi xmlns:a14="http://schemas.microsoft.com/office/drawing/2010/main" val="0"/>
+              </a:ext>
+            </a:extLst>
+          </a:blip>
+          <a:stretch>
+            <a:fillRect/>
+          </a:stretch>
+        </p:blipFill>
+        <p:spPr>
+          <a:xfrm>
+            <a:off x="4705350" y="1487686"/>
+            <a:ext cx="6648450" cy="3739753"/>
+          </a:xfrm>
+        </p:spPr>
+      </p:pic>
+      <p:sp>
+        <p:nvSpPr>
+          <p:cNvPr id="20" name="Slide Number Placeholder 19">
+            <a:extLst>
+              <a:ext uri="{FF2B5EF4-FFF2-40B4-BE49-F238E27FC236}">
+                <a16:creationId xmlns:a16="http://schemas.microsoft.com/office/drawing/2014/main" id="{3AEC0301-E9AA-4478-9E23-C372DBDCE653}"/>
+              </a:ext>
+            </a:extLst>
+          </p:cNvPr>
+          <p:cNvSpPr>
+            <a:spLocks noGrp="1"/>
+          </p:cNvSpPr>
+          <p:nvPr>
+            <p:ph type="sldNum" sz="quarter" idx="10"/>
+          </p:nvPr>
+        </p:nvSpPr>
+        <p:spPr>
+          <a:xfrm>
+            <a:off x="10717695" y="6363134"/>
+            <a:ext cx="838200" cy="360000"/>
+          </a:xfrm>
+        </p:spPr>
+        <p:txBody>
+          <a:bodyPr/>
+          <a:lstStyle/>
+          <a:p>
+            <a:r>
+              <a:rPr lang="en-US" dirty="0"/>
+              <a:t>PAGE </a:t>
+            </a:r>
+            <a:fld id="{4A9B5881-4007-4345-955A-79C2656F0C49}" type="slidenum">
+              <a:rPr lang="en-US" smtClean="0"/>
+              <a:pPr/>
+              <a:t>7</a:t>
+            </a:fld>
+            <a:endParaRPr lang="en-US" dirty="0"/>
+          </a:p>
+        </p:txBody>
+      </p:sp>
+      <p:sp>
+        <p:nvSpPr>
+          <p:cNvPr id="10" name="Isosceles Triangle 9">
+            <a:extLst>
+              <a:ext uri="{FF2B5EF4-FFF2-40B4-BE49-F238E27FC236}">
+                <a16:creationId xmlns:a16="http://schemas.microsoft.com/office/drawing/2014/main" id="{792980D7-ED01-4955-83DB-59BA18C94FBA}"/>
+              </a:ext>
+              <a:ext uri="{C183D7F6-B498-43B3-948B-1728B52AA6E4}">
+                <adec:decorative xmlns:adec="http://schemas.microsoft.com/office/drawing/2017/decorative" xmlns="" val="1"/>
+              </a:ext>
+            </a:extLst>
+          </p:cNvPr>
+          <p:cNvSpPr/>
+          <p:nvPr/>
+        </p:nvSpPr>
+        <p:spPr>
+          <a:xfrm rot="10800000">
+            <a:off x="10006315" y="6271566"/>
+            <a:ext cx="142847" cy="91567"/>
+          </a:xfrm>
+          <a:prstGeom prst="triangle">
+            <a:avLst/>
+          </a:prstGeom>
+          <a:solidFill>
+            <a:schemeClr val="bg1"/>
+          </a:solidFill>
+          <a:ln>
+            <a:noFill/>
+          </a:ln>
+        </p:spPr>
+        <p:style>
+          <a:lnRef idx="2">
+            <a:schemeClr val="accent1">
+              <a:shade val="50000"/>
+            </a:schemeClr>
+          </a:lnRef>
+          <a:fillRef idx="1">
+            <a:schemeClr val="accent1"/>
+          </a:fillRef>
+          <a:effectRef idx="0">
+            <a:schemeClr val="accent1"/>
+          </a:effectRef>
+          <a:fontRef idx="minor">
+            <a:schemeClr val="lt1"/>
+          </a:fontRef>
+        </p:style>
+        <p:txBody>
+          <a:bodyPr rtlCol="0" anchor="ctr"/>
+          <a:lstStyle/>
+          <a:p>
+            <a:pPr algn="ctr"/>
+            <a:endParaRPr lang="en-US" dirty="0"/>
+          </a:p>
+        </p:txBody>
+      </p:sp>
+    </p:spTree>
+    <p:extLst>
+      <p:ext uri="{BB962C8B-B14F-4D97-AF65-F5344CB8AC3E}">
+        <p14:creationId xmlns:p14="http://schemas.microsoft.com/office/powerpoint/2010/main" val="613291450"/>
       </p:ext>
     </p:extLst>
   </p:cSld>
@@ -5805,7 +6211,7 @@
   <a:extraClrSchemeLst/>
   <a:extLst>
     <a:ext uri="{05A4C25C-085E-4340-85A3-A5531E510DB2}">
-      <thm15:themeFamily xmlns:thm15="http://schemas.microsoft.com/office/thememl/2012/main" xmlns="" name="Classic-Corporate_Teach a Course_Win32_SB - v2" id="{AAA48AC2-5F99-4B13-8624-B64D50F70391}" vid="{7E93EDBA-CDC2-40D2-AD59-7619D791F782}"/>
+      <thm15:themeFamily xmlns:thm15="http://schemas.microsoft.com/office/thememl/2012/main" name="Classic-Corporate_Teach a Course_Win32_SB - v2" id="{AAA48AC2-5F99-4B13-8624-B64D50F70391}" vid="{7E93EDBA-CDC2-40D2-AD59-7619D791F782}"/>
     </a:ext>
   </a:extLst>
 </a:theme>
@@ -6100,7 +6506,7 @@
   <a:extraClrSchemeLst/>
   <a:extLst>
     <a:ext uri="{05A4C25C-085E-4340-85A3-A5531E510DB2}">
-      <thm15:themeFamily xmlns:thm15="http://schemas.microsoft.com/office/thememl/2012/main" xmlns="" name="Office Theme" id="{62F939B6-93AF-4DB8-9C6B-D6C7DFDC589F}" vid="{4A3C46E8-61CC-4603-A589-7422A47A8E4A}"/>
+      <thm15:themeFamily xmlns:thm15="http://schemas.microsoft.com/office/thememl/2012/main" name="Office Theme" id="{62F939B6-93AF-4DB8-9C6B-D6C7DFDC589F}" vid="{4A3C46E8-61CC-4603-A589-7422A47A8E4A}"/>
     </a:ext>
   </a:extLst>
 </a:theme>
@@ -6395,7 +6801,7 @@
   <a:extraClrSchemeLst/>
   <a:extLst>
     <a:ext uri="{05A4C25C-085E-4340-85A3-A5531E510DB2}">
-      <thm15:themeFamily xmlns:thm15="http://schemas.microsoft.com/office/thememl/2012/main" xmlns="" name="Office Theme" id="{62F939B6-93AF-4DB8-9C6B-D6C7DFDC589F}" vid="{4A3C46E8-61CC-4603-A589-7422A47A8E4A}"/>
+      <thm15:themeFamily xmlns:thm15="http://schemas.microsoft.com/office/thememl/2012/main" name="Office Theme" id="{62F939B6-93AF-4DB8-9C6B-D6C7DFDC589F}" vid="{4A3C46E8-61CC-4603-A589-7422A47A8E4A}"/>
     </a:ext>
   </a:extLst>
 </a:theme>
@@ -6488,21 +6894,21 @@
 </file>
 
 <file path=customXml/item1.xml><?xml version="1.0" encoding="utf-8"?>
+<p:properties xmlns:p="http://schemas.microsoft.com/office/2006/metadata/properties" xmlns:xsi="http://www.w3.org/2001/XMLSchema-instance" xmlns:pc="http://schemas.microsoft.com/office/infopath/2007/PartnerControls">
+  <documentManagement>
+    <Status xmlns="71af3243-3dd4-4a8d-8c0d-dd76da1f02a5">Not started</Status>
+    <MediaServiceKeyPoints xmlns="71af3243-3dd4-4a8d-8c0d-dd76da1f02a5" xsi:nil="true"/>
+  </documentManagement>
+</p:properties>
+</file>
+
+<file path=customXml/item2.xml><?xml version="1.0" encoding="utf-8"?>
 <?mso-contentType ?>
 <FormTemplates xmlns="http://schemas.microsoft.com/sharepoint/v3/contenttype/forms">
   <Display>DocumentLibraryForm</Display>
   <Edit>DocumentLibraryForm</Edit>
   <New>DocumentLibraryForm</New>
 </FormTemplates>
-</file>
-
-<file path=customXml/item2.xml><?xml version="1.0" encoding="utf-8"?>
-<p:properties xmlns:p="http://schemas.microsoft.com/office/2006/metadata/properties" xmlns:xsi="http://www.w3.org/2001/XMLSchema-instance" xmlns:pc="http://schemas.microsoft.com/office/infopath/2007/PartnerControls">
-  <documentManagement>
-    <Status xmlns="71af3243-3dd4-4a8d-8c0d-dd76da1f02a5">Not started</Status>
-    <MediaServiceKeyPoints xmlns="71af3243-3dd4-4a8d-8c0d-dd76da1f02a5" xsi:nil="true"/>
-  </documentManagement>
-</p:properties>
 </file>
 
 <file path=customXml/item3.xml><?xml version="1.0" encoding="utf-8"?>
@@ -6727,19 +7133,26 @@
 </file>
 
 <file path=customXml/itemProps1.xml><?xml version="1.0" encoding="utf-8"?>
-<ds:datastoreItem xmlns:ds="http://schemas.openxmlformats.org/officeDocument/2006/customXml" ds:itemID="{EBB7C387-AFDC-4FE3-A658-984B7F35F155}">
+<ds:datastoreItem xmlns:ds="http://schemas.openxmlformats.org/officeDocument/2006/customXml" ds:itemID="{F4E32C0B-4052-44CB-9341-8AD8B2CC4712}">
   <ds:schemaRefs>
-    <ds:schemaRef ds:uri="http://schemas.microsoft.com/sharepoint/v3/contenttype/forms"/>
+    <ds:schemaRef ds:uri="http://purl.org/dc/terms/"/>
+    <ds:schemaRef ds:uri="http://schemas.openxmlformats.org/package/2006/metadata/core-properties"/>
+    <ds:schemaRef ds:uri="16c05727-aa75-4e4a-9b5f-8a80a1165891"/>
+    <ds:schemaRef ds:uri="http://purl.org/dc/dcmitype/"/>
+    <ds:schemaRef ds:uri="http://schemas.microsoft.com/office/infopath/2007/PartnerControls"/>
+    <ds:schemaRef ds:uri="http://purl.org/dc/elements/1.1/"/>
+    <ds:schemaRef ds:uri="http://schemas.microsoft.com/office/2006/metadata/properties"/>
+    <ds:schemaRef ds:uri="http://schemas.microsoft.com/office/2006/documentManagement/types"/>
+    <ds:schemaRef ds:uri="71af3243-3dd4-4a8d-8c0d-dd76da1f02a5"/>
+    <ds:schemaRef ds:uri="http://www.w3.org/XML/1998/namespace"/>
   </ds:schemaRefs>
 </ds:datastoreItem>
 </file>
 
 <file path=customXml/itemProps2.xml><?xml version="1.0" encoding="utf-8"?>
-<ds:datastoreItem xmlns:ds="http://schemas.openxmlformats.org/officeDocument/2006/customXml" ds:itemID="{F4E32C0B-4052-44CB-9341-8AD8B2CC4712}">
+<ds:datastoreItem xmlns:ds="http://schemas.openxmlformats.org/officeDocument/2006/customXml" ds:itemID="{EBB7C387-AFDC-4FE3-A658-984B7F35F155}">
   <ds:schemaRefs>
-    <ds:schemaRef ds:uri="http://schemas.microsoft.com/office/2006/metadata/properties"/>
-    <ds:schemaRef ds:uri="http://schemas.microsoft.com/office/infopath/2007/PartnerControls"/>
-    <ds:schemaRef ds:uri="71af3243-3dd4-4a8d-8c0d-dd76da1f02a5"/>
+    <ds:schemaRef ds:uri="http://schemas.microsoft.com/sharepoint/v3/contenttype/forms"/>
   </ds:schemaRefs>
 </ds:datastoreItem>
 </file>

</xml_diff>